<commit_message>
ETB meeting presentation updates
</commit_message>
<xml_diff>
--- a/doc/gao_ai_proposal.pptx
+++ b/doc/gao_ai_proposal.pptx
@@ -14,10 +14,10 @@
     <p:sldId id="294" r:id="rId5"/>
     <p:sldId id="293" r:id="rId6"/>
     <p:sldId id="295" r:id="rId7"/>
-    <p:sldId id="297" r:id="rId8"/>
-    <p:sldId id="296" r:id="rId9"/>
-    <p:sldId id="298" r:id="rId10"/>
-    <p:sldId id="300" r:id="rId11"/>
+    <p:sldId id="302" r:id="rId8"/>
+    <p:sldId id="297" r:id="rId9"/>
+    <p:sldId id="304" r:id="rId10"/>
+    <p:sldId id="296" r:id="rId11"/>
     <p:sldId id="301" r:id="rId12"/>
   </p:sldIdLst>
   <p:sldSz cx="9144000" cy="5143500" type="screen16x9"/>
@@ -1032,7 +1032,7 @@
         <a:p>
           <a:r>
             <a:rPr lang="en-US" dirty="0"/>
-            <a:t>Monitoring</a:t>
+            <a:t>Performance</a:t>
           </a:r>
         </a:p>
       </dgm:t>
@@ -1068,7 +1068,7 @@
         <a:p>
           <a:r>
             <a:rPr lang="en-US" dirty="0"/>
-            <a:t>Performance</a:t>
+            <a:t>Monitoring</a:t>
           </a:r>
         </a:p>
       </dgm:t>
@@ -1458,7 +1458,7 @@
           </a:pPr>
           <a:r>
             <a:rPr lang="en-US" sz="3800" kern="1200" dirty="0"/>
-            <a:t>Monitoring</a:t>
+            <a:t>Performance</a:t>
           </a:r>
         </a:p>
       </dsp:txBody>
@@ -1552,7 +1552,7 @@
           </a:pPr>
           <a:r>
             <a:rPr lang="en-US" sz="3800" kern="1200" dirty="0"/>
-            <a:t>Performance</a:t>
+            <a:t>Monitoring</a:t>
           </a:r>
         </a:p>
       </dsp:txBody>
@@ -2828,7 +2828,7 @@
           <a:p>
             <a:fld id="{9C5B416F-12F7-8245-B7D4-D65FCD72D8E0}" type="datetimeFigureOut">
               <a:rPr lang="en-US" smtClean="0"/>
-              <a:t>7/24/23</a:t>
+              <a:t>7/26/23</a:t>
             </a:fld>
             <a:endParaRPr lang="en-US"/>
           </a:p>
@@ -2994,7 +2994,7 @@
           <a:p>
             <a:fld id="{24EA5F54-FBF3-1447-ACC7-2EF23A9C40CC}" type="datetimeFigureOut">
               <a:rPr lang="en-US" smtClean="0"/>
-              <a:t>7/24/23</a:t>
+              <a:t>7/26/23</a:t>
             </a:fld>
             <a:endParaRPr lang="en-US"/>
           </a:p>
@@ -3326,6 +3326,34 @@
             </a:r>
           </a:p>
           <a:p>
+            <a:pPr marL="0" marR="0" lvl="0" indent="0" algn="l" defTabSz="457200" rtl="0" eaLnBrk="1" fontAlgn="auto" latinLnBrk="0" hangingPunct="1">
+              <a:lnSpc>
+                <a:spcPct val="100000"/>
+              </a:lnSpc>
+              <a:spcBef>
+                <a:spcPts val="0"/>
+              </a:spcBef>
+              <a:spcAft>
+                <a:spcPts val="0"/>
+              </a:spcAft>
+              <a:buClrTx/>
+              <a:buSzTx/>
+              <a:buFontTx/>
+              <a:buNone/>
+              <a:tabLst/>
+              <a:defRPr/>
+            </a:pPr>
+            <a:r>
+              <a:rPr lang="en-US" b="1" dirty="0"/>
+              <a:t>Performance: </a:t>
+            </a:r>
+            <a:r>
+              <a:rPr lang="en-US" b="0" dirty="0"/>
+              <a:t>Produce results that are consistent with program objectives</a:t>
+            </a:r>
+            <a:endParaRPr lang="en-US" dirty="0"/>
+          </a:p>
+          <a:p>
             <a:r>
               <a:rPr lang="en-US" b="1" dirty="0"/>
               <a:t>Monitoring: </a:t>
@@ -3334,17 +3362,6 @@
               <a:rPr lang="en-US" b="0" dirty="0"/>
               <a:t>Ensure reliability and relevance over time</a:t>
             </a:r>
-          </a:p>
-          <a:p>
-            <a:r>
-              <a:rPr lang="en-US" b="1" dirty="0"/>
-              <a:t>Performance: </a:t>
-            </a:r>
-            <a:r>
-              <a:rPr lang="en-US" b="0" dirty="0"/>
-              <a:t>Produce results that are consistent with program objectives</a:t>
-            </a:r>
-            <a:endParaRPr lang="en-US" b="1" dirty="0"/>
           </a:p>
         </p:txBody>
       </p:sp>
@@ -3517,11 +3534,8 @@
           <a:p>
             <a:r>
               <a:rPr lang="en-US" dirty="0"/>
-              <a:t>Why neural networks? Why can’t we just use a function?</a:t>
+              <a:t>Describe the problem. Why is it a problem? Who does it affect? What is the proposed solution? How will the solution help?</a:t>
             </a:r>
-          </a:p>
-          <a:p>
-            <a:endParaRPr lang="en-US" dirty="0"/>
           </a:p>
         </p:txBody>
       </p:sp>
@@ -3551,7 +3565,207 @@
     </p:spTree>
     <p:extLst>
       <p:ext uri="{BB962C8B-B14F-4D97-AF65-F5344CB8AC3E}">
+        <p14:creationId xmlns:p14="http://schemas.microsoft.com/office/powerpoint/2010/main" val="736557669"/>
+      </p:ext>
+    </p:extLst>
+  </p:cSld>
+  <p:clrMapOvr>
+    <a:masterClrMapping/>
+  </p:clrMapOvr>
+</p:notes>
+</file>
+
+<file path=ppt/notesSlides/notesSlide4.xml><?xml version="1.0" encoding="utf-8"?>
+<p:notes xmlns:a="http://schemas.openxmlformats.org/drawingml/2006/main" xmlns:r="http://schemas.openxmlformats.org/officeDocument/2006/relationships" xmlns:p="http://schemas.openxmlformats.org/presentationml/2006/main">
+  <p:cSld>
+    <p:spTree>
+      <p:nvGrpSpPr>
+        <p:cNvPr id="1" name=""/>
+        <p:cNvGrpSpPr/>
+        <p:nvPr/>
+      </p:nvGrpSpPr>
+      <p:grpSpPr>
+        <a:xfrm>
+          <a:off x="0" y="0"/>
+          <a:ext cx="0" cy="0"/>
+          <a:chOff x="0" y="0"/>
+          <a:chExt cx="0" cy="0"/>
+        </a:xfrm>
+      </p:grpSpPr>
+      <p:sp>
+        <p:nvSpPr>
+          <p:cNvPr id="2" name="Slide Image Placeholder 1"/>
+          <p:cNvSpPr>
+            <a:spLocks noGrp="1" noRot="1" noChangeAspect="1"/>
+          </p:cNvSpPr>
+          <p:nvPr>
+            <p:ph type="sldImg"/>
+          </p:nvPr>
+        </p:nvSpPr>
+        <p:spPr/>
+      </p:sp>
+      <p:sp>
+        <p:nvSpPr>
+          <p:cNvPr id="3" name="Notes Placeholder 2"/>
+          <p:cNvSpPr>
+            <a:spLocks noGrp="1"/>
+          </p:cNvSpPr>
+          <p:nvPr>
+            <p:ph type="body" idx="1"/>
+          </p:nvPr>
+        </p:nvSpPr>
+        <p:spPr/>
+        <p:txBody>
+          <a:bodyPr/>
+          <a:lstStyle/>
+          <a:p>
+            <a:r>
+              <a:rPr lang="en-US" dirty="0"/>
+              <a:t>Why neural networks? Why can’t we just use a function?</a:t>
+            </a:r>
+          </a:p>
+          <a:p>
+            <a:pPr marL="0" marR="0" lvl="0" indent="0" algn="l" defTabSz="457200" rtl="0" eaLnBrk="1" fontAlgn="auto" latinLnBrk="0" hangingPunct="1">
+              <a:lnSpc>
+                <a:spcPct val="100000"/>
+              </a:lnSpc>
+              <a:spcBef>
+                <a:spcPts val="0"/>
+              </a:spcBef>
+              <a:spcAft>
+                <a:spcPts val="0"/>
+              </a:spcAft>
+              <a:buClrTx/>
+              <a:buSzTx/>
+              <a:buFontTx/>
+              <a:buNone/>
+              <a:tabLst/>
+              <a:defRPr/>
+            </a:pPr>
+            <a:r>
+              <a:rPr lang="en-US" dirty="0">
+                <a:effectLst/>
+                <a:latin typeface="Helvetica Neue" panose="02000503000000020004" pitchFamily="2" charset="0"/>
+              </a:rPr>
+              <a:t>No guidelines on scoring; there’s variability in how this is currently done (which will throw off numbers)</a:t>
+            </a:r>
+          </a:p>
+          <a:p>
+            <a:endParaRPr lang="en-US" dirty="0"/>
+          </a:p>
+        </p:txBody>
+      </p:sp>
+      <p:sp>
+        <p:nvSpPr>
+          <p:cNvPr id="4" name="Slide Number Placeholder 3"/>
+          <p:cNvSpPr>
+            <a:spLocks noGrp="1"/>
+          </p:cNvSpPr>
+          <p:nvPr>
+            <p:ph type="sldNum" sz="quarter" idx="5"/>
+          </p:nvPr>
+        </p:nvSpPr>
+        <p:spPr/>
+        <p:txBody>
+          <a:bodyPr/>
+          <a:lstStyle/>
+          <a:p>
+            <a:fld id="{33EBC398-93A2-8D47-92A2-63F46BBDFFD2}" type="slidenum">
+              <a:rPr lang="en-US" smtClean="0"/>
+              <a:t>5</a:t>
+            </a:fld>
+            <a:endParaRPr lang="en-US"/>
+          </a:p>
+        </p:txBody>
+      </p:sp>
+    </p:spTree>
+    <p:extLst>
+      <p:ext uri="{BB962C8B-B14F-4D97-AF65-F5344CB8AC3E}">
         <p14:creationId xmlns:p14="http://schemas.microsoft.com/office/powerpoint/2010/main" val="1575608483"/>
+      </p:ext>
+    </p:extLst>
+  </p:cSld>
+  <p:clrMapOvr>
+    <a:masterClrMapping/>
+  </p:clrMapOvr>
+</p:notes>
+</file>
+
+<file path=ppt/notesSlides/notesSlide5.xml><?xml version="1.0" encoding="utf-8"?>
+<p:notes xmlns:a="http://schemas.openxmlformats.org/drawingml/2006/main" xmlns:r="http://schemas.openxmlformats.org/officeDocument/2006/relationships" xmlns:p="http://schemas.openxmlformats.org/presentationml/2006/main">
+  <p:cSld>
+    <p:spTree>
+      <p:nvGrpSpPr>
+        <p:cNvPr id="1" name=""/>
+        <p:cNvGrpSpPr/>
+        <p:nvPr/>
+      </p:nvGrpSpPr>
+      <p:grpSpPr>
+        <a:xfrm>
+          <a:off x="0" y="0"/>
+          <a:ext cx="0" cy="0"/>
+          <a:chOff x="0" y="0"/>
+          <a:chExt cx="0" cy="0"/>
+        </a:xfrm>
+      </p:grpSpPr>
+      <p:sp>
+        <p:nvSpPr>
+          <p:cNvPr id="2" name="Slide Image Placeholder 1"/>
+          <p:cNvSpPr>
+            <a:spLocks noGrp="1" noRot="1" noChangeAspect="1"/>
+          </p:cNvSpPr>
+          <p:nvPr>
+            <p:ph type="sldImg"/>
+          </p:nvPr>
+        </p:nvSpPr>
+        <p:spPr/>
+      </p:sp>
+      <p:sp>
+        <p:nvSpPr>
+          <p:cNvPr id="3" name="Notes Placeholder 2"/>
+          <p:cNvSpPr>
+            <a:spLocks noGrp="1"/>
+          </p:cNvSpPr>
+          <p:nvPr>
+            <p:ph type="body" idx="1"/>
+          </p:nvPr>
+        </p:nvSpPr>
+        <p:spPr/>
+        <p:txBody>
+          <a:bodyPr/>
+          <a:lstStyle/>
+          <a:p>
+            <a:endParaRPr lang="en-US" dirty="0"/>
+          </a:p>
+        </p:txBody>
+      </p:sp>
+      <p:sp>
+        <p:nvSpPr>
+          <p:cNvPr id="4" name="Slide Number Placeholder 3"/>
+          <p:cNvSpPr>
+            <a:spLocks noGrp="1"/>
+          </p:cNvSpPr>
+          <p:nvPr>
+            <p:ph type="sldNum" sz="quarter" idx="5"/>
+          </p:nvPr>
+        </p:nvSpPr>
+        <p:spPr/>
+        <p:txBody>
+          <a:bodyPr/>
+          <a:lstStyle/>
+          <a:p>
+            <a:fld id="{33EBC398-93A2-8D47-92A2-63F46BBDFFD2}" type="slidenum">
+              <a:rPr lang="en-US" smtClean="0"/>
+              <a:t>6</a:t>
+            </a:fld>
+            <a:endParaRPr lang="en-US"/>
+          </a:p>
+        </p:txBody>
+      </p:sp>
+    </p:spTree>
+    <p:extLst>
+      <p:ext uri="{BB962C8B-B14F-4D97-AF65-F5344CB8AC3E}">
+        <p14:creationId xmlns:p14="http://schemas.microsoft.com/office/powerpoint/2010/main" val="3124520235"/>
       </p:ext>
     </p:extLst>
   </p:cSld>
@@ -5677,7 +5891,7 @@
                 <a:ea typeface="+mn-ea"/>
                 <a:cs typeface="+mn-cs"/>
               </a:rPr>
-              <a:t>Month XX, 2023</a:t>
+              <a:t>July 28, 2023</a:t>
             </a:r>
           </a:p>
         </p:txBody>
@@ -5792,7 +6006,7 @@
           <p:nvPr>
             <p:extLst>
               <p:ext uri="{D42A27DB-BD31-4B8C-83A1-F6EECF244321}">
-                <p14:modId xmlns:p14="http://schemas.microsoft.com/office/powerpoint/2010/main" val="1240667044"/>
+                <p14:modId xmlns:p14="http://schemas.microsoft.com/office/powerpoint/2010/main" val="1421702641"/>
               </p:ext>
             </p:extLst>
           </p:nvPr>
@@ -6512,6 +6726,132 @@
                   <a:schemeClr val="bg1"/>
                 </a:solidFill>
               </a:rPr>
+              <a:t>Framework Standardization</a:t>
+            </a:r>
+          </a:p>
+        </p:txBody>
+      </p:sp>
+      <p:pic>
+        <p:nvPicPr>
+          <p:cNvPr id="8" name="Picture 7" descr="A white table with numbers&#10;&#10;Description automatically generated">
+            <a:extLst>
+              <a:ext uri="{FF2B5EF4-FFF2-40B4-BE49-F238E27FC236}">
+                <a16:creationId xmlns:a16="http://schemas.microsoft.com/office/drawing/2014/main" id="{145C2D8A-FB9B-16C8-9D71-430C65EC61F5}"/>
+              </a:ext>
+            </a:extLst>
+          </p:cNvPr>
+          <p:cNvPicPr>
+            <a:picLocks noChangeAspect="1"/>
+          </p:cNvPicPr>
+          <p:nvPr/>
+        </p:nvPicPr>
+        <p:blipFill rotWithShape="1">
+          <a:blip r:embed="rId3"/>
+          <a:srcRect b="2843"/>
+          <a:stretch/>
+        </p:blipFill>
+        <p:spPr>
+          <a:xfrm>
+            <a:off x="1" y="1862418"/>
+            <a:ext cx="9118704" cy="1378324"/>
+          </a:xfrm>
+          <a:prstGeom prst="rect">
+            <a:avLst/>
+          </a:prstGeom>
+        </p:spPr>
+      </p:pic>
+    </p:spTree>
+    <p:extLst>
+      <p:ext uri="{BB962C8B-B14F-4D97-AF65-F5344CB8AC3E}">
+        <p14:creationId xmlns:p14="http://schemas.microsoft.com/office/powerpoint/2010/main" val="2746291621"/>
+      </p:ext>
+    </p:extLst>
+  </p:cSld>
+  <p:clrMapOvr>
+    <a:masterClrMapping/>
+  </p:clrMapOvr>
+</p:sld>
+</file>
+
+<file path=ppt/slides/slide5.xml><?xml version="1.0" encoding="utf-8"?>
+<p:sld xmlns:a="http://schemas.openxmlformats.org/drawingml/2006/main" xmlns:r="http://schemas.openxmlformats.org/officeDocument/2006/relationships" xmlns:p="http://schemas.openxmlformats.org/presentationml/2006/main">
+  <p:cSld>
+    <p:spTree>
+      <p:nvGrpSpPr>
+        <p:cNvPr id="1" name=""/>
+        <p:cNvGrpSpPr/>
+        <p:nvPr/>
+      </p:nvGrpSpPr>
+      <p:grpSpPr>
+        <a:xfrm>
+          <a:off x="0" y="0"/>
+          <a:ext cx="0" cy="0"/>
+          <a:chOff x="0" y="0"/>
+          <a:chExt cx="0" cy="0"/>
+        </a:xfrm>
+      </p:grpSpPr>
+      <p:sp>
+        <p:nvSpPr>
+          <p:cNvPr id="2" name="Slide Number Placeholder 1">
+            <a:extLst>
+              <a:ext uri="{FF2B5EF4-FFF2-40B4-BE49-F238E27FC236}">
+                <a16:creationId xmlns:a16="http://schemas.microsoft.com/office/drawing/2014/main" id="{C3876B54-91C7-4CA0-981B-0280BE7EB7E4}"/>
+              </a:ext>
+            </a:extLst>
+          </p:cNvPr>
+          <p:cNvSpPr>
+            <a:spLocks noGrp="1"/>
+          </p:cNvSpPr>
+          <p:nvPr>
+            <p:ph type="sldNum" sz="quarter" idx="4"/>
+          </p:nvPr>
+        </p:nvSpPr>
+        <p:spPr/>
+        <p:txBody>
+          <a:bodyPr/>
+          <a:lstStyle/>
+          <a:p>
+            <a:r>
+              <a:rPr lang="en-US"/>
+              <a:t>Presented by DHS | </a:t>
+            </a:r>
+            <a:fld id="{8997B844-ACA2-A34A-B180-F01E98B0D70C}" type="slidenum">
+              <a:rPr lang="en-US" smtClean="0"/>
+              <a:pPr/>
+              <a:t>5</a:t>
+            </a:fld>
+            <a:endParaRPr lang="en-US" dirty="0"/>
+          </a:p>
+        </p:txBody>
+      </p:sp>
+      <p:sp>
+        <p:nvSpPr>
+          <p:cNvPr id="3" name="Title 2">
+            <a:extLst>
+              <a:ext uri="{FF2B5EF4-FFF2-40B4-BE49-F238E27FC236}">
+                <a16:creationId xmlns:a16="http://schemas.microsoft.com/office/drawing/2014/main" id="{9D6973F2-923D-4F4F-8A40-6D33454876B0}"/>
+              </a:ext>
+            </a:extLst>
+          </p:cNvPr>
+          <p:cNvSpPr>
+            <a:spLocks noGrp="1"/>
+          </p:cNvSpPr>
+          <p:nvPr>
+            <p:ph type="title"/>
+          </p:nvPr>
+        </p:nvSpPr>
+        <p:spPr/>
+        <p:txBody>
+          <a:bodyPr/>
+          <a:lstStyle/>
+          <a:p>
+            <a:pPr algn="l"/>
+            <a:r>
+              <a:rPr lang="en-US" dirty="0">
+                <a:solidFill>
+                  <a:schemeClr val="bg1"/>
+                </a:solidFill>
+              </a:rPr>
               <a:t>Neural Network Approach</a:t>
             </a:r>
           </a:p>
@@ -7980,7 +8320,7 @@
         <p:spPr>
           <a:xfrm>
             <a:off x="6101644" y="2545727"/>
-            <a:ext cx="2049233" cy="246221"/>
+            <a:ext cx="2262427" cy="246221"/>
           </a:xfrm>
           <a:prstGeom prst="rect">
             <a:avLst/>
@@ -8008,7 +8348,7 @@
                 <a:latin typeface="Calibri" panose="020F0502020204030204" pitchFamily="34" charset="0"/>
                 <a:cs typeface="Calibri" panose="020F0502020204030204" pitchFamily="34" charset="0"/>
               </a:rPr>
-              <a:t>0-69 = No</a:t>
+              <a:t>0-69% = No</a:t>
             </a:r>
             <a:r>
               <a:rPr lang="en-US" sz="1000" dirty="0">
@@ -8025,7 +8365,7 @@
                 <a:latin typeface="Calibri" panose="020F0502020204030204" pitchFamily="34" charset="0"/>
                 <a:cs typeface="Calibri" panose="020F0502020204030204" pitchFamily="34" charset="0"/>
               </a:rPr>
-              <a:t>70-100 = Yes</a:t>
+              <a:t>70-100% = Yes</a:t>
             </a:r>
           </a:p>
         </p:txBody>
@@ -8518,150 +8858,6 @@
 </p:sld>
 </file>
 
-<file path=ppt/slides/slide5.xml><?xml version="1.0" encoding="utf-8"?>
-<p:sld xmlns:a="http://schemas.openxmlformats.org/drawingml/2006/main" xmlns:r="http://schemas.openxmlformats.org/officeDocument/2006/relationships" xmlns:p="http://schemas.openxmlformats.org/presentationml/2006/main">
-  <p:cSld>
-    <p:spTree>
-      <p:nvGrpSpPr>
-        <p:cNvPr id="1" name=""/>
-        <p:cNvGrpSpPr/>
-        <p:nvPr/>
-      </p:nvGrpSpPr>
-      <p:grpSpPr>
-        <a:xfrm>
-          <a:off x="0" y="0"/>
-          <a:ext cx="0" cy="0"/>
-          <a:chOff x="0" y="0"/>
-          <a:chExt cx="0" cy="0"/>
-        </a:xfrm>
-      </p:grpSpPr>
-      <p:sp>
-        <p:nvSpPr>
-          <p:cNvPr id="2" name="Slide Number Placeholder 1">
-            <a:extLst>
-              <a:ext uri="{FF2B5EF4-FFF2-40B4-BE49-F238E27FC236}">
-                <a16:creationId xmlns:a16="http://schemas.microsoft.com/office/drawing/2014/main" id="{C3876B54-91C7-4CA0-981B-0280BE7EB7E4}"/>
-              </a:ext>
-            </a:extLst>
-          </p:cNvPr>
-          <p:cNvSpPr>
-            <a:spLocks noGrp="1"/>
-          </p:cNvSpPr>
-          <p:nvPr>
-            <p:ph type="sldNum" sz="quarter" idx="4"/>
-          </p:nvPr>
-        </p:nvSpPr>
-        <p:spPr/>
-        <p:txBody>
-          <a:bodyPr/>
-          <a:lstStyle/>
-          <a:p>
-            <a:r>
-              <a:rPr lang="en-US"/>
-              <a:t>Presented by DHS | </a:t>
-            </a:r>
-            <a:fld id="{8997B844-ACA2-A34A-B180-F01E98B0D70C}" type="slidenum">
-              <a:rPr lang="en-US" smtClean="0"/>
-              <a:pPr/>
-              <a:t>5</a:t>
-            </a:fld>
-            <a:endParaRPr lang="en-US" dirty="0"/>
-          </a:p>
-        </p:txBody>
-      </p:sp>
-      <p:sp>
-        <p:nvSpPr>
-          <p:cNvPr id="3" name="Title 2">
-            <a:extLst>
-              <a:ext uri="{FF2B5EF4-FFF2-40B4-BE49-F238E27FC236}">
-                <a16:creationId xmlns:a16="http://schemas.microsoft.com/office/drawing/2014/main" id="{9D6973F2-923D-4F4F-8A40-6D33454876B0}"/>
-              </a:ext>
-            </a:extLst>
-          </p:cNvPr>
-          <p:cNvSpPr>
-            <a:spLocks noGrp="1"/>
-          </p:cNvSpPr>
-          <p:nvPr>
-            <p:ph type="title"/>
-          </p:nvPr>
-        </p:nvSpPr>
-        <p:spPr/>
-        <p:txBody>
-          <a:bodyPr/>
-          <a:lstStyle/>
-          <a:p>
-            <a:pPr algn="l"/>
-            <a:r>
-              <a:rPr lang="en-US" dirty="0">
-                <a:solidFill>
-                  <a:schemeClr val="bg1"/>
-                </a:solidFill>
-              </a:rPr>
-              <a:t>Proposed Solution</a:t>
-            </a:r>
-          </a:p>
-        </p:txBody>
-      </p:sp>
-      <p:sp>
-        <p:nvSpPr>
-          <p:cNvPr id="4" name="TextBox 3">
-            <a:extLst>
-              <a:ext uri="{FF2B5EF4-FFF2-40B4-BE49-F238E27FC236}">
-                <a16:creationId xmlns:a16="http://schemas.microsoft.com/office/drawing/2014/main" id="{1954E349-71A7-4F07-BE46-5220998D5B87}"/>
-              </a:ext>
-            </a:extLst>
-          </p:cNvPr>
-          <p:cNvSpPr txBox="1"/>
-          <p:nvPr/>
-        </p:nvSpPr>
-        <p:spPr>
-          <a:xfrm>
-            <a:off x="1790055" y="1782305"/>
-            <a:ext cx="5594888" cy="1477328"/>
-          </a:xfrm>
-          <a:prstGeom prst="rect">
-            <a:avLst/>
-          </a:prstGeom>
-          <a:noFill/>
-        </p:spPr>
-        <p:txBody>
-          <a:bodyPr wrap="square" rtlCol="0">
-            <a:spAutoFit/>
-          </a:bodyPr>
-          <a:lstStyle/>
-          <a:p>
-            <a:r>
-              <a:rPr lang="en-US" dirty="0"/>
-              <a:t>High-level overview of solution</a:t>
-            </a:r>
-          </a:p>
-          <a:p>
-            <a:r>
-              <a:rPr lang="en-US" dirty="0"/>
-              <a:t>Provide simple diagram of solution of user submitting a CSV file to the hypothetical solution</a:t>
-            </a:r>
-          </a:p>
-          <a:p>
-            <a:r>
-              <a:rPr lang="en-US" dirty="0"/>
-              <a:t>Note that the system could be used/developed by GSA, AI system owners</a:t>
-            </a:r>
-          </a:p>
-        </p:txBody>
-      </p:sp>
-    </p:spTree>
-    <p:extLst>
-      <p:ext uri="{BB962C8B-B14F-4D97-AF65-F5344CB8AC3E}">
-        <p14:creationId xmlns:p14="http://schemas.microsoft.com/office/powerpoint/2010/main" val="1315636942"/>
-      </p:ext>
-    </p:extLst>
-  </p:cSld>
-  <p:clrMapOvr>
-    <a:masterClrMapping/>
-  </p:clrMapOvr>
-</p:sld>
-</file>
-
 <file path=ppt/slides/slide6.xml><?xml version="1.0" encoding="utf-8"?>
 <p:sld xmlns:a="http://schemas.openxmlformats.org/drawingml/2006/main" xmlns:r="http://schemas.openxmlformats.org/officeDocument/2006/relationships" xmlns:p="http://schemas.openxmlformats.org/presentationml/2006/main">
   <p:cSld>
@@ -8731,9 +8927,7 @@
         </p:nvSpPr>
         <p:spPr/>
         <p:txBody>
-          <a:bodyPr>
-            <a:normAutofit/>
-          </a:bodyPr>
+          <a:bodyPr/>
           <a:lstStyle/>
           <a:p>
             <a:pPr algn="l"/>
@@ -8743,15 +8937,135 @@
                   <a:schemeClr val="bg1"/>
                 </a:solidFill>
               </a:rPr>
-              <a:t>Determining Compliance with Results</a:t>
+              <a:t>Model Performance (Accuracy)</a:t>
             </a:r>
           </a:p>
         </p:txBody>
       </p:sp>
+      <p:pic>
+        <p:nvPicPr>
+          <p:cNvPr id="6" name="Picture 5" descr="A graph with blue and orange lines&#10;&#10;Description automatically generated">
+            <a:extLst>
+              <a:ext uri="{FF2B5EF4-FFF2-40B4-BE49-F238E27FC236}">
+                <a16:creationId xmlns:a16="http://schemas.microsoft.com/office/drawing/2014/main" id="{62DEF4AD-AFF4-81C1-6629-2A64A04B8B4C}"/>
+              </a:ext>
+            </a:extLst>
+          </p:cNvPr>
+          <p:cNvPicPr>
+            <a:picLocks noChangeAspect="1"/>
+          </p:cNvPicPr>
+          <p:nvPr/>
+        </p:nvPicPr>
+        <p:blipFill>
+          <a:blip r:embed="rId3"/>
+          <a:stretch>
+            <a:fillRect/>
+          </a:stretch>
+        </p:blipFill>
+        <p:spPr>
+          <a:xfrm>
+            <a:off x="590468" y="2857382"/>
+            <a:ext cx="2994901" cy="1821073"/>
+          </a:xfrm>
+          <a:prstGeom prst="rect">
+            <a:avLst/>
+          </a:prstGeom>
+        </p:spPr>
+      </p:pic>
+      <p:pic>
+        <p:nvPicPr>
+          <p:cNvPr id="11" name="Picture 10" descr="A graph with blue lines and orange lines&#10;&#10;Description automatically generated">
+            <a:extLst>
+              <a:ext uri="{FF2B5EF4-FFF2-40B4-BE49-F238E27FC236}">
+                <a16:creationId xmlns:a16="http://schemas.microsoft.com/office/drawing/2014/main" id="{65F67A0E-C35E-3AF9-EFC5-387A3F9F907E}"/>
+              </a:ext>
+            </a:extLst>
+          </p:cNvPr>
+          <p:cNvPicPr>
+            <a:picLocks noChangeAspect="1"/>
+          </p:cNvPicPr>
+          <p:nvPr/>
+        </p:nvPicPr>
+        <p:blipFill>
+          <a:blip r:embed="rId4"/>
+          <a:stretch>
+            <a:fillRect/>
+          </a:stretch>
+        </p:blipFill>
+        <p:spPr>
+          <a:xfrm>
+            <a:off x="5347521" y="2934617"/>
+            <a:ext cx="2557948" cy="1743839"/>
+          </a:xfrm>
+          <a:prstGeom prst="rect">
+            <a:avLst/>
+          </a:prstGeom>
+        </p:spPr>
+      </p:pic>
+      <p:pic>
+        <p:nvPicPr>
+          <p:cNvPr id="13" name="Picture 12" descr="A graph with blue and orange lines&#10;&#10;Description automatically generated">
+            <a:extLst>
+              <a:ext uri="{FF2B5EF4-FFF2-40B4-BE49-F238E27FC236}">
+                <a16:creationId xmlns:a16="http://schemas.microsoft.com/office/drawing/2014/main" id="{8AB8B9A6-B0A1-3353-FC85-01398E93AA83}"/>
+              </a:ext>
+            </a:extLst>
+          </p:cNvPr>
+          <p:cNvPicPr>
+            <a:picLocks noChangeAspect="1"/>
+          </p:cNvPicPr>
+          <p:nvPr/>
+        </p:nvPicPr>
+        <p:blipFill>
+          <a:blip r:embed="rId5"/>
+          <a:stretch>
+            <a:fillRect/>
+          </a:stretch>
+        </p:blipFill>
+        <p:spPr>
+          <a:xfrm>
+            <a:off x="590467" y="715057"/>
+            <a:ext cx="2994901" cy="2142326"/>
+          </a:xfrm>
+          <a:prstGeom prst="rect">
+            <a:avLst/>
+          </a:prstGeom>
+        </p:spPr>
+      </p:pic>
+      <p:pic>
+        <p:nvPicPr>
+          <p:cNvPr id="15" name="Picture 14" descr="A graph with blue and orange lines&#10;&#10;Description automatically generated">
+            <a:extLst>
+              <a:ext uri="{FF2B5EF4-FFF2-40B4-BE49-F238E27FC236}">
+                <a16:creationId xmlns:a16="http://schemas.microsoft.com/office/drawing/2014/main" id="{5BB9DD5D-A4F9-F662-FF40-A40C9457B778}"/>
+              </a:ext>
+            </a:extLst>
+          </p:cNvPr>
+          <p:cNvPicPr>
+            <a:picLocks noChangeAspect="1"/>
+          </p:cNvPicPr>
+          <p:nvPr/>
+        </p:nvPicPr>
+        <p:blipFill>
+          <a:blip r:embed="rId6"/>
+          <a:stretch>
+            <a:fillRect/>
+          </a:stretch>
+        </p:blipFill>
+        <p:spPr>
+          <a:xfrm>
+            <a:off x="5047871" y="715057"/>
+            <a:ext cx="2857598" cy="2219560"/>
+          </a:xfrm>
+          <a:prstGeom prst="rect">
+            <a:avLst/>
+          </a:prstGeom>
+        </p:spPr>
+      </p:pic>
     </p:spTree>
     <p:extLst>
       <p:ext uri="{BB962C8B-B14F-4D97-AF65-F5344CB8AC3E}">
-        <p14:creationId xmlns:p14="http://schemas.microsoft.com/office/powerpoint/2010/main" val="1298156160"/>
+        <p14:creationId xmlns:p14="http://schemas.microsoft.com/office/powerpoint/2010/main" val="2703077859"/>
       </p:ext>
     </p:extLst>
   </p:cSld>
@@ -8840,15 +9154,44 @@
                   <a:schemeClr val="bg1"/>
                 </a:solidFill>
               </a:rPr>
-              <a:t>Example</a:t>
+              <a:t>User Submission</a:t>
             </a:r>
           </a:p>
         </p:txBody>
       </p:sp>
+      <p:pic>
+        <p:nvPicPr>
+          <p:cNvPr id="6" name="Picture 5" descr="A screenshot of a computer&#10;&#10;Description automatically generated">
+            <a:extLst>
+              <a:ext uri="{FF2B5EF4-FFF2-40B4-BE49-F238E27FC236}">
+                <a16:creationId xmlns:a16="http://schemas.microsoft.com/office/drawing/2014/main" id="{1DE84FB6-9D43-A269-048A-6B150AB18FCB}"/>
+              </a:ext>
+            </a:extLst>
+          </p:cNvPr>
+          <p:cNvPicPr>
+            <a:picLocks noChangeAspect="1"/>
+          </p:cNvPicPr>
+          <p:nvPr/>
+        </p:nvPicPr>
+        <p:blipFill rotWithShape="1">
+          <a:blip r:embed="rId2"/>
+          <a:srcRect t="7582" r="5668"/>
+          <a:stretch/>
+        </p:blipFill>
+        <p:spPr>
+          <a:xfrm>
+            <a:off x="2486516" y="712694"/>
+            <a:ext cx="4162843" cy="3984104"/>
+          </a:xfrm>
+          <a:prstGeom prst="rect">
+            <a:avLst/>
+          </a:prstGeom>
+        </p:spPr>
+      </p:pic>
     </p:spTree>
     <p:extLst>
       <p:ext uri="{BB962C8B-B14F-4D97-AF65-F5344CB8AC3E}">
-        <p14:creationId xmlns:p14="http://schemas.microsoft.com/office/powerpoint/2010/main" val="1445793840"/>
+        <p14:creationId xmlns:p14="http://schemas.microsoft.com/office/powerpoint/2010/main" val="1315636942"/>
       </p:ext>
     </p:extLst>
   </p:cSld>
@@ -8932,18 +9275,122 @@
           <a:p>
             <a:pPr algn="l"/>
             <a:r>
-              <a:rPr lang="en-US">
+              <a:rPr lang="en-US" dirty="0">
                 <a:solidFill>
                   <a:schemeClr val="bg1"/>
                 </a:solidFill>
               </a:rPr>
-              <a:t>Next Steps</a:t>
+              <a:t>Going Forward</a:t>
             </a:r>
-            <a:endParaRPr lang="en-US" dirty="0">
-              <a:solidFill>
-                <a:schemeClr val="bg1"/>
-              </a:solidFill>
-            </a:endParaRPr>
+          </a:p>
+        </p:txBody>
+      </p:sp>
+      <p:sp>
+        <p:nvSpPr>
+          <p:cNvPr id="6" name="TextBox 5">
+            <a:extLst>
+              <a:ext uri="{FF2B5EF4-FFF2-40B4-BE49-F238E27FC236}">
+                <a16:creationId xmlns:a16="http://schemas.microsoft.com/office/drawing/2014/main" id="{06A3DF41-1875-CFCE-B358-C57008E730C8}"/>
+              </a:ext>
+            </a:extLst>
+          </p:cNvPr>
+          <p:cNvSpPr txBox="1"/>
+          <p:nvPr/>
+        </p:nvSpPr>
+        <p:spPr>
+          <a:xfrm>
+            <a:off x="342900" y="860612"/>
+            <a:ext cx="8377518" cy="2352952"/>
+          </a:xfrm>
+          <a:prstGeom prst="rect">
+            <a:avLst/>
+          </a:prstGeom>
+          <a:noFill/>
+        </p:spPr>
+        <p:txBody>
+          <a:bodyPr wrap="square" rtlCol="0">
+            <a:spAutoFit/>
+          </a:bodyPr>
+          <a:lstStyle/>
+          <a:p>
+            <a:pPr marL="285750" indent="-285750">
+              <a:lnSpc>
+                <a:spcPct val="150000"/>
+              </a:lnSpc>
+              <a:buFont typeface="Arial" panose="020B0604020202020204" pitchFamily="34" charset="0"/>
+              <a:buChar char="•"/>
+            </a:pPr>
+            <a:r>
+              <a:rPr lang="en-US" sz="2000" dirty="0">
+                <a:latin typeface="Calibri" panose="020F0502020204030204" pitchFamily="34" charset="0"/>
+                <a:cs typeface="Calibri" panose="020F0502020204030204" pitchFamily="34" charset="0"/>
+              </a:rPr>
+              <a:t>Fine-tune training data &amp; parameters</a:t>
+            </a:r>
+          </a:p>
+          <a:p>
+            <a:pPr marL="285750" indent="-285750">
+              <a:lnSpc>
+                <a:spcPct val="150000"/>
+              </a:lnSpc>
+              <a:buFont typeface="Arial" panose="020B0604020202020204" pitchFamily="34" charset="0"/>
+              <a:buChar char="•"/>
+            </a:pPr>
+            <a:r>
+              <a:rPr lang="en-US" sz="2000" dirty="0">
+                <a:latin typeface="Calibri" panose="020F0502020204030204" pitchFamily="34" charset="0"/>
+                <a:cs typeface="Calibri" panose="020F0502020204030204" pitchFamily="34" charset="0"/>
+              </a:rPr>
+              <a:t>Further guidance on scoring from GAO</a:t>
+            </a:r>
+          </a:p>
+          <a:p>
+            <a:pPr marL="742950" lvl="1" indent="-285750">
+              <a:lnSpc>
+                <a:spcPct val="150000"/>
+              </a:lnSpc>
+              <a:buFont typeface="Arial" panose="020B0604020202020204" pitchFamily="34" charset="0"/>
+              <a:buChar char="•"/>
+            </a:pPr>
+            <a:r>
+              <a:rPr lang="en-US" sz="2000" dirty="0">
+                <a:latin typeface="Calibri" panose="020F0502020204030204" pitchFamily="34" charset="0"/>
+                <a:cs typeface="Calibri" panose="020F0502020204030204" pitchFamily="34" charset="0"/>
+              </a:rPr>
+              <a:t>Possibility of rules instituted to handle edge cases?</a:t>
+            </a:r>
+          </a:p>
+          <a:p>
+            <a:pPr marL="285750" indent="-285750">
+              <a:lnSpc>
+                <a:spcPct val="150000"/>
+              </a:lnSpc>
+              <a:buFont typeface="Arial" panose="020B0604020202020204" pitchFamily="34" charset="0"/>
+              <a:buChar char="•"/>
+            </a:pPr>
+            <a:r>
+              <a:rPr lang="en-US" sz="2000" dirty="0">
+                <a:latin typeface="Calibri" panose="020F0502020204030204" pitchFamily="34" charset="0"/>
+                <a:cs typeface="Calibri" panose="020F0502020204030204" pitchFamily="34" charset="0"/>
+              </a:rPr>
+              <a:t>Collaboration on stand-up service with GAO</a:t>
+            </a:r>
+          </a:p>
+          <a:p>
+            <a:pPr marL="285750" indent="-285750">
+              <a:lnSpc>
+                <a:spcPct val="150000"/>
+              </a:lnSpc>
+              <a:buFont typeface="Arial" panose="020B0604020202020204" pitchFamily="34" charset="0"/>
+              <a:buChar char="•"/>
+            </a:pPr>
+            <a:r>
+              <a:rPr lang="en-US" sz="2000" dirty="0">
+                <a:latin typeface="Calibri" panose="020F0502020204030204" pitchFamily="34" charset="0"/>
+                <a:cs typeface="Calibri" panose="020F0502020204030204" pitchFamily="34" charset="0"/>
+              </a:rPr>
+              <a:t>Enhance/expand upon guidance for GAO framework (AI principles)</a:t>
+            </a:r>
           </a:p>
         </p:txBody>
       </p:sp>
@@ -9936,6 +10383,12 @@
 </file>
 
 <file path=customXml/item1.xml><?xml version="1.0" encoding="utf-8"?>
+<p:properties xmlns:p="http://schemas.microsoft.com/office/2006/metadata/properties" xmlns:xsi="http://www.w3.org/2001/XMLSchema-instance" xmlns:pc="http://schemas.microsoft.com/office/infopath/2007/PartnerControls">
+  <documentManagement/>
+</p:properties>
+</file>
+
+<file path=customXml/item2.xml><?xml version="1.0" encoding="utf-8"?>
 <ct:contentTypeSchema xmlns:ct="http://schemas.microsoft.com/office/2006/metadata/contentType" xmlns:ma="http://schemas.microsoft.com/office/2006/metadata/properties/metaAttributes" ct:_="" ma:_="" ma:contentTypeName="Document" ma:contentTypeID="0x010100C11066598DA2094897C17F025BEB5C33" ma:contentTypeVersion="11" ma:contentTypeDescription="Create a new document." ma:contentTypeScope="" ma:versionID="c132620416a636482ab79dc02cb4beda">
   <xsd:schema xmlns:xsd="http://www.w3.org/2001/XMLSchema" xmlns:xs="http://www.w3.org/2001/XMLSchema" xmlns:p="http://schemas.microsoft.com/office/2006/metadata/properties" xmlns:ns2="cc02a9f5-0e8f-478d-ae46-fce6cd025606" xmlns:ns3="5ed103a9-c213-4e89-b04a-978a9c9d0ecb" targetNamespace="http://schemas.microsoft.com/office/2006/metadata/properties" ma:root="true" ma:fieldsID="25d1ba42b03243f6fad1194b6d2737ac" ns2:_="" ns3:_="">
     <xsd:import namespace="cc02a9f5-0e8f-478d-ae46-fce6cd025606"/>
@@ -10144,12 +10597,6 @@
 </ct:contentTypeSchema>
 </file>
 
-<file path=customXml/item2.xml><?xml version="1.0" encoding="utf-8"?>
-<p:properties xmlns:p="http://schemas.microsoft.com/office/2006/metadata/properties" xmlns:xsi="http://www.w3.org/2001/XMLSchema-instance" xmlns:pc="http://schemas.microsoft.com/office/infopath/2007/PartnerControls">
-  <documentManagement/>
-</p:properties>
-</file>
-
 <file path=customXml/item3.xml><?xml version="1.0" encoding="utf-8"?>
 <?mso-contentType ?>
 <FormTemplates xmlns="http://schemas.microsoft.com/sharepoint/v3/contenttype/forms">
@@ -10160,6 +10607,23 @@
 </file>
 
 <file path=customXml/itemProps1.xml><?xml version="1.0" encoding="utf-8"?>
+<ds:datastoreItem xmlns:ds="http://schemas.openxmlformats.org/officeDocument/2006/customXml" ds:itemID="{10D81E0D-2C63-4EA5-9F60-BC113953F389}">
+  <ds:schemaRefs>
+    <ds:schemaRef ds:uri="http://www.w3.org/XML/1998/namespace"/>
+    <ds:schemaRef ds:uri="http://schemas.microsoft.com/office/infopath/2007/PartnerControls"/>
+    <ds:schemaRef ds:uri="http://schemas.microsoft.com/office/2006/documentManagement/types"/>
+    <ds:schemaRef ds:uri="http://purl.org/dc/dcmitype/"/>
+    <ds:schemaRef ds:uri="cc02a9f5-0e8f-478d-ae46-fce6cd025606"/>
+    <ds:schemaRef ds:uri="http://schemas.openxmlformats.org/package/2006/metadata/core-properties"/>
+    <ds:schemaRef ds:uri="http://schemas.microsoft.com/office/2006/metadata/properties"/>
+    <ds:schemaRef ds:uri="5ed103a9-c213-4e89-b04a-978a9c9d0ecb"/>
+    <ds:schemaRef ds:uri="http://purl.org/dc/terms/"/>
+    <ds:schemaRef ds:uri="http://purl.org/dc/elements/1.1/"/>
+  </ds:schemaRefs>
+</ds:datastoreItem>
+</file>
+
+<file path=customXml/itemProps2.xml><?xml version="1.0" encoding="utf-8"?>
 <ds:datastoreItem xmlns:ds="http://schemas.openxmlformats.org/officeDocument/2006/customXml" ds:itemID="{048D89ED-6A25-4B9D-BC75-65054FB7685E}">
   <ds:schemaRefs>
     <ds:schemaRef ds:uri="http://schemas.microsoft.com/office/2006/metadata/contentType"/>
@@ -10178,23 +10642,6 @@
 </ds:datastoreItem>
 </file>
 
-<file path=customXml/itemProps2.xml><?xml version="1.0" encoding="utf-8"?>
-<ds:datastoreItem xmlns:ds="http://schemas.openxmlformats.org/officeDocument/2006/customXml" ds:itemID="{10D81E0D-2C63-4EA5-9F60-BC113953F389}">
-  <ds:schemaRefs>
-    <ds:schemaRef ds:uri="http://www.w3.org/XML/1998/namespace"/>
-    <ds:schemaRef ds:uri="http://schemas.microsoft.com/office/infopath/2007/PartnerControls"/>
-    <ds:schemaRef ds:uri="http://schemas.microsoft.com/office/2006/documentManagement/types"/>
-    <ds:schemaRef ds:uri="http://purl.org/dc/dcmitype/"/>
-    <ds:schemaRef ds:uri="cc02a9f5-0e8f-478d-ae46-fce6cd025606"/>
-    <ds:schemaRef ds:uri="http://schemas.openxmlformats.org/package/2006/metadata/core-properties"/>
-    <ds:schemaRef ds:uri="http://schemas.microsoft.com/office/2006/metadata/properties"/>
-    <ds:schemaRef ds:uri="5ed103a9-c213-4e89-b04a-978a9c9d0ecb"/>
-    <ds:schemaRef ds:uri="http://purl.org/dc/terms/"/>
-    <ds:schemaRef ds:uri="http://purl.org/dc/elements/1.1/"/>
-  </ds:schemaRefs>
-</ds:datastoreItem>
-</file>
-
 <file path=customXml/itemProps3.xml><?xml version="1.0" encoding="utf-8"?>
 <ds:datastoreItem xmlns:ds="http://schemas.openxmlformats.org/officeDocument/2006/customXml" ds:itemID="{478A104F-5518-4387-A41C-C91F45F51F72}">
   <ds:schemaRefs>

</xml_diff>

<commit_message>
Tuesday pptx meeting updates
</commit_message>
<xml_diff>
--- a/doc/gao_ai_proposal.pptx
+++ b/doc/gao_ai_proposal.pptx
@@ -5,24 +5,25 @@
     <p:sldMasterId id="2147483664" r:id="rId4"/>
   </p:sldMasterIdLst>
   <p:notesMasterIdLst>
-    <p:notesMasterId r:id="rId17"/>
+    <p:notesMasterId r:id="rId18"/>
   </p:notesMasterIdLst>
   <p:handoutMasterIdLst>
-    <p:handoutMasterId r:id="rId18"/>
+    <p:handoutMasterId r:id="rId19"/>
   </p:handoutMasterIdLst>
   <p:sldIdLst>
     <p:sldId id="294" r:id="rId5"/>
     <p:sldId id="305" r:id="rId6"/>
-    <p:sldId id="293" r:id="rId7"/>
-    <p:sldId id="295" r:id="rId8"/>
-    <p:sldId id="307" r:id="rId9"/>
-    <p:sldId id="310" r:id="rId10"/>
-    <p:sldId id="308" r:id="rId11"/>
-    <p:sldId id="297" r:id="rId12"/>
-    <p:sldId id="304" r:id="rId13"/>
-    <p:sldId id="309" r:id="rId14"/>
-    <p:sldId id="296" r:id="rId15"/>
-    <p:sldId id="301" r:id="rId16"/>
+    <p:sldId id="311" r:id="rId7"/>
+    <p:sldId id="293" r:id="rId8"/>
+    <p:sldId id="295" r:id="rId9"/>
+    <p:sldId id="307" r:id="rId10"/>
+    <p:sldId id="310" r:id="rId11"/>
+    <p:sldId id="308" r:id="rId12"/>
+    <p:sldId id="297" r:id="rId13"/>
+    <p:sldId id="304" r:id="rId14"/>
+    <p:sldId id="309" r:id="rId15"/>
+    <p:sldId id="296" r:id="rId16"/>
+    <p:sldId id="301" r:id="rId17"/>
   </p:sldIdLst>
   <p:sldSz cx="9144000" cy="5143500" type="screen16x9"/>
   <p:notesSz cx="7010400" cy="9296400"/>
@@ -272,7 +273,7 @@
           <a:p>
             <a:fld id="{9C5B416F-12F7-8245-B7D4-D65FCD72D8E0}" type="datetimeFigureOut">
               <a:rPr lang="en-US" smtClean="0"/>
-              <a:t>8/1/2023</a:t>
+              <a:t>8/2/23</a:t>
             </a:fld>
             <a:endParaRPr lang="en-US"/>
           </a:p>
@@ -438,7 +439,7 @@
           <a:p>
             <a:fld id="{24EA5F54-FBF3-1447-ACC7-2EF23A9C40CC}" type="datetimeFigureOut">
               <a:rPr lang="en-US" smtClean="0"/>
-              <a:t>8/1/2023</a:t>
+              <a:t>8/2/23</a:t>
             </a:fld>
             <a:endParaRPr lang="en-US"/>
           </a:p>
@@ -750,62 +751,7 @@
           <a:bodyPr/>
           <a:lstStyle/>
           <a:p>
-            <a:r>
-              <a:rPr lang="en-US" b="1" dirty="0"/>
-              <a:t>Governance: </a:t>
-            </a:r>
-            <a:r>
-              <a:rPr lang="en-US" dirty="0"/>
-              <a:t>Promote accountability by establishing processes to manage, operate, and oversee implementation</a:t>
-            </a:r>
-          </a:p>
-          <a:p>
-            <a:r>
-              <a:rPr lang="en-US" b="1" dirty="0"/>
-              <a:t>Data: </a:t>
-            </a:r>
-            <a:r>
-              <a:rPr lang="en-US" dirty="0"/>
-              <a:t>Ensure quality, reliability, and representativeness of data sources and processing</a:t>
-            </a:r>
-          </a:p>
-          <a:p>
-            <a:pPr marL="0" marR="0" lvl="0" indent="0" algn="l" defTabSz="457200" rtl="0" eaLnBrk="1" fontAlgn="auto" latinLnBrk="0" hangingPunct="1">
-              <a:lnSpc>
-                <a:spcPct val="100000"/>
-              </a:lnSpc>
-              <a:spcBef>
-                <a:spcPts val="0"/>
-              </a:spcBef>
-              <a:spcAft>
-                <a:spcPts val="0"/>
-              </a:spcAft>
-              <a:buClrTx/>
-              <a:buSzTx/>
-              <a:buFontTx/>
-              <a:buNone/>
-              <a:tabLst/>
-              <a:defRPr/>
-            </a:pPr>
-            <a:r>
-              <a:rPr lang="en-US" b="1" dirty="0"/>
-              <a:t>Performance: </a:t>
-            </a:r>
-            <a:r>
-              <a:rPr lang="en-US" b="0" dirty="0"/>
-              <a:t>Produce results that are consistent with program objectives</a:t>
-            </a:r>
-            <a:endParaRPr lang="en-US" dirty="0"/>
-          </a:p>
-          <a:p>
-            <a:r>
-              <a:rPr lang="en-US" b="1" dirty="0"/>
-              <a:t>Monitoring: </a:t>
-            </a:r>
-            <a:r>
-              <a:rPr lang="en-US" b="0" dirty="0"/>
-              <a:t>Ensure reliability and relevance over time</a:t>
-            </a:r>
+            <a:endParaRPr lang="en-US" b="0" dirty="0"/>
           </a:p>
         </p:txBody>
       </p:sp>
@@ -836,6 +782,90 @@
     <p:extLst>
       <p:ext uri="{BB962C8B-B14F-4D97-AF65-F5344CB8AC3E}">
         <p14:creationId xmlns:p14="http://schemas.microsoft.com/office/powerpoint/2010/main" val="1798658606"/>
+      </p:ext>
+    </p:extLst>
+  </p:cSld>
+  <p:clrMapOvr>
+    <a:masterClrMapping/>
+  </p:clrMapOvr>
+</p:notes>
+</file>
+
+<file path=ppt/notesSlides/notesSlide10.xml><?xml version="1.0" encoding="utf-8"?>
+<p:notes xmlns:a="http://schemas.openxmlformats.org/drawingml/2006/main" xmlns:r="http://schemas.openxmlformats.org/officeDocument/2006/relationships" xmlns:p="http://schemas.openxmlformats.org/presentationml/2006/main">
+  <p:cSld>
+    <p:spTree>
+      <p:nvGrpSpPr>
+        <p:cNvPr id="1" name=""/>
+        <p:cNvGrpSpPr/>
+        <p:nvPr/>
+      </p:nvGrpSpPr>
+      <p:grpSpPr>
+        <a:xfrm>
+          <a:off x="0" y="0"/>
+          <a:ext cx="0" cy="0"/>
+          <a:chOff x="0" y="0"/>
+          <a:chExt cx="0" cy="0"/>
+        </a:xfrm>
+      </p:grpSpPr>
+      <p:sp>
+        <p:nvSpPr>
+          <p:cNvPr id="2" name="Slide Image Placeholder 1"/>
+          <p:cNvSpPr>
+            <a:spLocks noGrp="1" noRot="1" noChangeAspect="1"/>
+          </p:cNvSpPr>
+          <p:nvPr>
+            <p:ph type="sldImg"/>
+          </p:nvPr>
+        </p:nvSpPr>
+        <p:spPr/>
+      </p:sp>
+      <p:sp>
+        <p:nvSpPr>
+          <p:cNvPr id="3" name="Notes Placeholder 2"/>
+          <p:cNvSpPr>
+            <a:spLocks noGrp="1"/>
+          </p:cNvSpPr>
+          <p:nvPr>
+            <p:ph type="body" idx="1"/>
+          </p:nvPr>
+        </p:nvSpPr>
+        <p:spPr/>
+        <p:txBody>
+          <a:bodyPr/>
+          <a:lstStyle/>
+          <a:p>
+            <a:endParaRPr lang="en-US" dirty="0"/>
+          </a:p>
+        </p:txBody>
+      </p:sp>
+      <p:sp>
+        <p:nvSpPr>
+          <p:cNvPr id="4" name="Slide Number Placeholder 3"/>
+          <p:cNvSpPr>
+            <a:spLocks noGrp="1"/>
+          </p:cNvSpPr>
+          <p:nvPr>
+            <p:ph type="sldNum" sz="quarter" idx="5"/>
+          </p:nvPr>
+        </p:nvSpPr>
+        <p:spPr/>
+        <p:txBody>
+          <a:bodyPr/>
+          <a:lstStyle/>
+          <a:p>
+            <a:fld id="{33EBC398-93A2-8D47-92A2-63F46BBDFFD2}" type="slidenum">
+              <a:rPr lang="en-US" smtClean="0"/>
+              <a:t>11</a:t>
+            </a:fld>
+            <a:endParaRPr lang="en-US"/>
+          </a:p>
+        </p:txBody>
+      </p:sp>
+    </p:spTree>
+    <p:extLst>
+      <p:ext uri="{BB962C8B-B14F-4D97-AF65-F5344CB8AC3E}">
+        <p14:creationId xmlns:p14="http://schemas.microsoft.com/office/powerpoint/2010/main" val="3558223331"/>
       </p:ext>
     </p:extLst>
   </p:cSld>
@@ -889,70 +919,7 @@
           <a:bodyPr/>
           <a:lstStyle/>
           <a:p>
-            <a:r>
-              <a:rPr lang="en-US" b="1" dirty="0"/>
-              <a:t>Governance: </a:t>
-            </a:r>
-            <a:r>
-              <a:rPr lang="en-US" b="0" dirty="0"/>
-              <a:t>The Governance Principle Framework promotes </a:t>
-            </a:r>
-            <a:r>
-              <a:rPr lang="en-US" dirty="0"/>
-              <a:t>accountability by establishing processes to manage, operate, and oversee implementation</a:t>
-            </a:r>
-          </a:p>
-          <a:p>
-            <a:r>
-              <a:rPr lang="en-US" b="1" dirty="0"/>
-              <a:t>Data:  </a:t>
-            </a:r>
-            <a:r>
-              <a:rPr lang="en-US" b="0" dirty="0"/>
-              <a:t>The Data Principle Framework ensures </a:t>
-            </a:r>
-            <a:r>
-              <a:rPr lang="en-US" dirty="0"/>
-              <a:t>quality, reliability, and representativeness of data sources and processing</a:t>
-            </a:r>
-          </a:p>
-          <a:p>
-            <a:pPr marL="0" marR="0" lvl="0" indent="0" algn="l" defTabSz="457200" rtl="0" eaLnBrk="1" fontAlgn="auto" latinLnBrk="0" hangingPunct="1">
-              <a:lnSpc>
-                <a:spcPct val="100000"/>
-              </a:lnSpc>
-              <a:spcBef>
-                <a:spcPts val="0"/>
-              </a:spcBef>
-              <a:spcAft>
-                <a:spcPts val="0"/>
-              </a:spcAft>
-              <a:buClrTx/>
-              <a:buSzTx/>
-              <a:buFontTx/>
-              <a:buNone/>
-              <a:tabLst/>
-              <a:defRPr/>
-            </a:pPr>
-            <a:r>
-              <a:rPr lang="en-US" b="1" dirty="0"/>
-              <a:t>Performance:  </a:t>
-            </a:r>
-            <a:r>
-              <a:rPr lang="en-US" b="0" dirty="0"/>
-              <a:t>The Performance Principle Framework produces results that are consistent with program objectives</a:t>
-            </a:r>
-            <a:endParaRPr lang="en-US" dirty="0"/>
-          </a:p>
-          <a:p>
-            <a:r>
-              <a:rPr lang="en-US" b="1" dirty="0"/>
-              <a:t>Monitoring: </a:t>
-            </a:r>
-            <a:r>
-              <a:rPr lang="en-US" b="0" dirty="0"/>
-              <a:t>The Monitoring Principle Framework ensures reliability and relevance over time</a:t>
-            </a:r>
+            <a:endParaRPr lang="en-US" b="0" dirty="0"/>
           </a:p>
         </p:txBody>
       </p:sp>
@@ -982,7 +949,7 @@
     </p:spTree>
     <p:extLst>
       <p:ext uri="{BB962C8B-B14F-4D97-AF65-F5344CB8AC3E}">
-        <p14:creationId xmlns:p14="http://schemas.microsoft.com/office/powerpoint/2010/main" val="2925478240"/>
+        <p14:creationId xmlns:p14="http://schemas.microsoft.com/office/powerpoint/2010/main" val="1525950077"/>
       </p:ext>
     </p:extLst>
   </p:cSld>
@@ -1037,8 +1004,68 @@
           <a:lstStyle/>
           <a:p>
             <a:r>
+              <a:rPr lang="en-US" b="1" dirty="0"/>
+              <a:t>Governance: </a:t>
+            </a:r>
+            <a:r>
+              <a:rPr lang="en-US" b="0" dirty="0"/>
+              <a:t>The Governance Principle Framework promotes </a:t>
+            </a:r>
+            <a:r>
               <a:rPr lang="en-US" dirty="0"/>
-              <a:t>Describe the problem. Why is it a problem? Who does it affect?</a:t>
+              <a:t>accountability by establishing processes to manage, operate, and oversee implementation</a:t>
+            </a:r>
+          </a:p>
+          <a:p>
+            <a:r>
+              <a:rPr lang="en-US" b="1" dirty="0"/>
+              <a:t>Data:  </a:t>
+            </a:r>
+            <a:r>
+              <a:rPr lang="en-US" b="0" dirty="0"/>
+              <a:t>The Data Principle Framework ensures </a:t>
+            </a:r>
+            <a:r>
+              <a:rPr lang="en-US" dirty="0"/>
+              <a:t>quality, reliability, and representativeness of data sources and processing</a:t>
+            </a:r>
+          </a:p>
+          <a:p>
+            <a:pPr marL="0" marR="0" lvl="0" indent="0" algn="l" defTabSz="457200" rtl="0" eaLnBrk="1" fontAlgn="auto" latinLnBrk="0" hangingPunct="1">
+              <a:lnSpc>
+                <a:spcPct val="100000"/>
+              </a:lnSpc>
+              <a:spcBef>
+                <a:spcPts val="0"/>
+              </a:spcBef>
+              <a:spcAft>
+                <a:spcPts val="0"/>
+              </a:spcAft>
+              <a:buClrTx/>
+              <a:buSzTx/>
+              <a:buFontTx/>
+              <a:buNone/>
+              <a:tabLst/>
+              <a:defRPr/>
+            </a:pPr>
+            <a:r>
+              <a:rPr lang="en-US" b="1" dirty="0"/>
+              <a:t>Performance:  </a:t>
+            </a:r>
+            <a:r>
+              <a:rPr lang="en-US" b="0" dirty="0"/>
+              <a:t>The Performance Principle Framework produces results that are consistent with program objectives</a:t>
+            </a:r>
+            <a:endParaRPr lang="en-US" dirty="0"/>
+          </a:p>
+          <a:p>
+            <a:r>
+              <a:rPr lang="en-US" b="1" dirty="0"/>
+              <a:t>Monitoring: </a:t>
+            </a:r>
+            <a:r>
+              <a:rPr lang="en-US" b="0" dirty="0"/>
+              <a:t>The Monitoring Principle Framework ensures reliability and relevance over time</a:t>
             </a:r>
           </a:p>
         </p:txBody>
@@ -1069,7 +1096,7 @@
     </p:spTree>
     <p:extLst>
       <p:ext uri="{BB962C8B-B14F-4D97-AF65-F5344CB8AC3E}">
-        <p14:creationId xmlns:p14="http://schemas.microsoft.com/office/powerpoint/2010/main" val="728776142"/>
+        <p14:creationId xmlns:p14="http://schemas.microsoft.com/office/powerpoint/2010/main" val="2925478240"/>
       </p:ext>
     </p:extLst>
   </p:cSld>
@@ -1123,10 +1150,7 @@
           <a:bodyPr/>
           <a:lstStyle/>
           <a:p>
-            <a:r>
-              <a:rPr lang="en-US" dirty="0"/>
-              <a:t>Describe the problem. Why is it a problem? Who does it affect? What is the proposed solution? How will the solution help?</a:t>
-            </a:r>
+            <a:endParaRPr lang="en-US" dirty="0"/>
           </a:p>
         </p:txBody>
       </p:sp>
@@ -1156,7 +1180,7 @@
     </p:spTree>
     <p:extLst>
       <p:ext uri="{BB962C8B-B14F-4D97-AF65-F5344CB8AC3E}">
-        <p14:creationId xmlns:p14="http://schemas.microsoft.com/office/powerpoint/2010/main" val="3831815249"/>
+        <p14:creationId xmlns:p14="http://schemas.microsoft.com/office/powerpoint/2010/main" val="728776142"/>
       </p:ext>
     </p:extLst>
   </p:cSld>
@@ -1210,10 +1234,7 @@
           <a:bodyPr/>
           <a:lstStyle/>
           <a:p>
-            <a:r>
-              <a:rPr lang="en-US" dirty="0"/>
-              <a:t>Describe the problem. Why is it a problem? Who does it affect? What is the proposed solution? How will the solution help?</a:t>
-            </a:r>
+            <a:endParaRPr lang="en-US" dirty="0"/>
           </a:p>
         </p:txBody>
       </p:sp>
@@ -1243,7 +1264,7 @@
     </p:spTree>
     <p:extLst>
       <p:ext uri="{BB962C8B-B14F-4D97-AF65-F5344CB8AC3E}">
-        <p14:creationId xmlns:p14="http://schemas.microsoft.com/office/powerpoint/2010/main" val="2626035200"/>
+        <p14:creationId xmlns:p14="http://schemas.microsoft.com/office/powerpoint/2010/main" val="3831815249"/>
       </p:ext>
     </p:extLst>
   </p:cSld>
@@ -1297,10 +1318,7 @@
           <a:bodyPr/>
           <a:lstStyle/>
           <a:p>
-            <a:r>
-              <a:rPr lang="en-US" dirty="0"/>
-              <a:t>Describe the problem. Why is it a problem? Who does it affect? What is the proposed solution? How will the solution help?</a:t>
-            </a:r>
+            <a:endParaRPr lang="en-US" dirty="0"/>
           </a:p>
         </p:txBody>
       </p:sp>
@@ -1330,7 +1348,7 @@
     </p:spTree>
     <p:extLst>
       <p:ext uri="{BB962C8B-B14F-4D97-AF65-F5344CB8AC3E}">
-        <p14:creationId xmlns:p14="http://schemas.microsoft.com/office/powerpoint/2010/main" val="2348178394"/>
+        <p14:creationId xmlns:p14="http://schemas.microsoft.com/office/powerpoint/2010/main" val="2626035200"/>
       </p:ext>
     </p:extLst>
   </p:cSld>
@@ -1384,50 +1402,6 @@
           <a:bodyPr/>
           <a:lstStyle/>
           <a:p>
-            <a:r>
-              <a:rPr lang="en-US" dirty="0"/>
-              <a:t>What is the proposed solution? How will the solution help?</a:t>
-            </a:r>
-          </a:p>
-          <a:p>
-            <a:r>
-              <a:rPr lang="en-US" dirty="0"/>
-              <a:t>NN: performs calculations using some (or all) of the neurons in the last layer of the neural network, which uses these values in the next layer of the neural network</a:t>
-            </a:r>
-          </a:p>
-          <a:p>
-            <a:r>
-              <a:rPr lang="en-US" dirty="0"/>
-              <a:t>Why neural networks? Why can’t we just use a function?</a:t>
-            </a:r>
-          </a:p>
-          <a:p>
-            <a:pPr marL="0" marR="0" lvl="0" indent="0" algn="l" defTabSz="457200" rtl="0" eaLnBrk="1" fontAlgn="auto" latinLnBrk="0" hangingPunct="1">
-              <a:lnSpc>
-                <a:spcPct val="100000"/>
-              </a:lnSpc>
-              <a:spcBef>
-                <a:spcPts val="0"/>
-              </a:spcBef>
-              <a:spcAft>
-                <a:spcPts val="0"/>
-              </a:spcAft>
-              <a:buClrTx/>
-              <a:buSzTx/>
-              <a:buFontTx/>
-              <a:buNone/>
-              <a:tabLst/>
-              <a:defRPr/>
-            </a:pPr>
-            <a:r>
-              <a:rPr lang="en-US" dirty="0">
-                <a:effectLst/>
-                <a:latin typeface="Helvetica Neue" panose="02000503000000020004" pitchFamily="2" charset="0"/>
-              </a:rPr>
-              <a:t>No guidelines on scoring; there’s variability in how this is currently done (which will throw off numbers) </a:t>
-            </a:r>
-          </a:p>
-          <a:p>
             <a:endParaRPr lang="en-US" dirty="0"/>
           </a:p>
         </p:txBody>
@@ -1458,7 +1432,7 @@
     </p:spTree>
     <p:extLst>
       <p:ext uri="{BB962C8B-B14F-4D97-AF65-F5344CB8AC3E}">
-        <p14:creationId xmlns:p14="http://schemas.microsoft.com/office/powerpoint/2010/main" val="1575608483"/>
+        <p14:creationId xmlns:p14="http://schemas.microsoft.com/office/powerpoint/2010/main" val="2348178394"/>
       </p:ext>
     </p:extLst>
   </p:cSld>
@@ -1514,8 +1488,49 @@
           <a:p>
             <a:r>
               <a:rPr lang="en-US" dirty="0"/>
-              <a:t>Validation: allows for unbiased evaluation of a model fit on the training data set while tuning the hyperparameters (the number of hidden units in a neural network)</a:t>
-            </a:r>
+              <a:t>What is the proposed solution? How will the solution help?</a:t>
+            </a:r>
+          </a:p>
+          <a:p>
+            <a:r>
+              <a:rPr lang="en-US" dirty="0"/>
+              <a:t>NN: performs calculations using some (or all) of the neurons in the last layer of the neural network, which uses these values in the next layer of the neural network</a:t>
+            </a:r>
+          </a:p>
+          <a:p>
+            <a:r>
+              <a:rPr lang="en-US" dirty="0"/>
+              <a:t>Why neural networks? Why can’t we just use a function?</a:t>
+            </a:r>
+          </a:p>
+          <a:p>
+            <a:pPr marL="0" marR="0" lvl="0" indent="0" algn="l" defTabSz="457200" rtl="0" eaLnBrk="1" fontAlgn="auto" latinLnBrk="0" hangingPunct="1">
+              <a:lnSpc>
+                <a:spcPct val="100000"/>
+              </a:lnSpc>
+              <a:spcBef>
+                <a:spcPts val="0"/>
+              </a:spcBef>
+              <a:spcAft>
+                <a:spcPts val="0"/>
+              </a:spcAft>
+              <a:buClrTx/>
+              <a:buSzTx/>
+              <a:buFontTx/>
+              <a:buNone/>
+              <a:tabLst/>
+              <a:defRPr/>
+            </a:pPr>
+            <a:r>
+              <a:rPr lang="en-US" dirty="0">
+                <a:effectLst/>
+                <a:latin typeface="Helvetica Neue" panose="02000503000000020004" pitchFamily="2" charset="0"/>
+              </a:rPr>
+              <a:t>No guidelines on scoring; there’s variability in how this is currently done (which will throw off numbers) </a:t>
+            </a:r>
+          </a:p>
+          <a:p>
+            <a:endParaRPr lang="en-US" dirty="0"/>
           </a:p>
         </p:txBody>
       </p:sp>
@@ -1545,7 +1560,7 @@
     </p:spTree>
     <p:extLst>
       <p:ext uri="{BB962C8B-B14F-4D97-AF65-F5344CB8AC3E}">
-        <p14:creationId xmlns:p14="http://schemas.microsoft.com/office/powerpoint/2010/main" val="3124520235"/>
+        <p14:creationId xmlns:p14="http://schemas.microsoft.com/office/powerpoint/2010/main" val="1575608483"/>
       </p:ext>
     </p:extLst>
   </p:cSld>
@@ -1601,7 +1616,7 @@
           <a:p>
             <a:r>
               <a:rPr lang="en-US" dirty="0"/>
-              <a:t>Describe the problem. Why is it a problem? Who does it affect? What is the proposed solution? How will the solution help?</a:t>
+              <a:t>Validation: allows for unbiased evaluation of a model fit on the training data set while tuning the hyperparameters (the number of hidden units in a neural network)</a:t>
             </a:r>
           </a:p>
         </p:txBody>
@@ -1632,7 +1647,7 @@
     </p:spTree>
     <p:extLst>
       <p:ext uri="{BB962C8B-B14F-4D97-AF65-F5344CB8AC3E}">
-        <p14:creationId xmlns:p14="http://schemas.microsoft.com/office/powerpoint/2010/main" val="3558223331"/>
+        <p14:creationId xmlns:p14="http://schemas.microsoft.com/office/powerpoint/2010/main" val="3124520235"/>
       </p:ext>
     </p:extLst>
   </p:cSld>
@@ -3758,7 +3773,7 @@
                 <a:ea typeface="+mn-ea"/>
                 <a:cs typeface="+mn-cs"/>
               </a:rPr>
-              <a:t>July 28, 2023</a:t>
+              <a:t>August 3, 2023</a:t>
             </a:r>
           </a:p>
         </p:txBody>
@@ -3822,6 +3837,222 @@
               <a:rPr lang="en-US" smtClean="0"/>
               <a:pPr/>
               <a:t>10</a:t>
+            </a:fld>
+            <a:endParaRPr lang="en-US" dirty="0"/>
+          </a:p>
+        </p:txBody>
+      </p:sp>
+      <p:sp>
+        <p:nvSpPr>
+          <p:cNvPr id="3" name="Title 2">
+            <a:extLst>
+              <a:ext uri="{FF2B5EF4-FFF2-40B4-BE49-F238E27FC236}">
+                <a16:creationId xmlns:a16="http://schemas.microsoft.com/office/drawing/2014/main" id="{9D6973F2-923D-4F4F-8A40-6D33454876B0}"/>
+              </a:ext>
+            </a:extLst>
+          </p:cNvPr>
+          <p:cNvSpPr>
+            <a:spLocks noGrp="1"/>
+          </p:cNvSpPr>
+          <p:nvPr>
+            <p:ph type="title"/>
+          </p:nvPr>
+        </p:nvSpPr>
+        <p:spPr/>
+        <p:txBody>
+          <a:bodyPr/>
+          <a:lstStyle/>
+          <a:p>
+            <a:r>
+              <a:rPr lang="en-US" dirty="0">
+                <a:solidFill>
+                  <a:schemeClr val="bg1"/>
+                </a:solidFill>
+              </a:rPr>
+              <a:t>Model Performance (Accuracy)</a:t>
+            </a:r>
+          </a:p>
+        </p:txBody>
+      </p:sp>
+      <p:pic>
+        <p:nvPicPr>
+          <p:cNvPr id="6" name="Picture 5" descr="A graph with blue and orange lines&#10;&#10;Description automatically generated">
+            <a:extLst>
+              <a:ext uri="{FF2B5EF4-FFF2-40B4-BE49-F238E27FC236}">
+                <a16:creationId xmlns:a16="http://schemas.microsoft.com/office/drawing/2014/main" id="{62DEF4AD-AFF4-81C1-6629-2A64A04B8B4C}"/>
+              </a:ext>
+            </a:extLst>
+          </p:cNvPr>
+          <p:cNvPicPr>
+            <a:picLocks noChangeAspect="1"/>
+          </p:cNvPicPr>
+          <p:nvPr/>
+        </p:nvPicPr>
+        <p:blipFill>
+          <a:blip r:embed="rId3"/>
+          <a:stretch>
+            <a:fillRect/>
+          </a:stretch>
+        </p:blipFill>
+        <p:spPr>
+          <a:xfrm>
+            <a:off x="590468" y="2857382"/>
+            <a:ext cx="2994901" cy="1821073"/>
+          </a:xfrm>
+          <a:prstGeom prst="rect">
+            <a:avLst/>
+          </a:prstGeom>
+        </p:spPr>
+      </p:pic>
+      <p:pic>
+        <p:nvPicPr>
+          <p:cNvPr id="11" name="Picture 10" descr="A graph with blue lines and orange lines&#10;&#10;Description automatically generated">
+            <a:extLst>
+              <a:ext uri="{FF2B5EF4-FFF2-40B4-BE49-F238E27FC236}">
+                <a16:creationId xmlns:a16="http://schemas.microsoft.com/office/drawing/2014/main" id="{65F67A0E-C35E-3AF9-EFC5-387A3F9F907E}"/>
+              </a:ext>
+            </a:extLst>
+          </p:cNvPr>
+          <p:cNvPicPr>
+            <a:picLocks noChangeAspect="1"/>
+          </p:cNvPicPr>
+          <p:nvPr/>
+        </p:nvPicPr>
+        <p:blipFill>
+          <a:blip r:embed="rId4"/>
+          <a:stretch>
+            <a:fillRect/>
+          </a:stretch>
+        </p:blipFill>
+        <p:spPr>
+          <a:xfrm>
+            <a:off x="5347521" y="2934617"/>
+            <a:ext cx="2557948" cy="1743839"/>
+          </a:xfrm>
+          <a:prstGeom prst="rect">
+            <a:avLst/>
+          </a:prstGeom>
+        </p:spPr>
+      </p:pic>
+      <p:pic>
+        <p:nvPicPr>
+          <p:cNvPr id="13" name="Picture 12" descr="A graph with blue and orange lines&#10;&#10;Description automatically generated">
+            <a:extLst>
+              <a:ext uri="{FF2B5EF4-FFF2-40B4-BE49-F238E27FC236}">
+                <a16:creationId xmlns:a16="http://schemas.microsoft.com/office/drawing/2014/main" id="{8AB8B9A6-B0A1-3353-FC85-01398E93AA83}"/>
+              </a:ext>
+            </a:extLst>
+          </p:cNvPr>
+          <p:cNvPicPr>
+            <a:picLocks noChangeAspect="1"/>
+          </p:cNvPicPr>
+          <p:nvPr/>
+        </p:nvPicPr>
+        <p:blipFill>
+          <a:blip r:embed="rId5"/>
+          <a:stretch>
+            <a:fillRect/>
+          </a:stretch>
+        </p:blipFill>
+        <p:spPr>
+          <a:xfrm>
+            <a:off x="590467" y="715057"/>
+            <a:ext cx="2994901" cy="2142326"/>
+          </a:xfrm>
+          <a:prstGeom prst="rect">
+            <a:avLst/>
+          </a:prstGeom>
+        </p:spPr>
+      </p:pic>
+      <p:pic>
+        <p:nvPicPr>
+          <p:cNvPr id="15" name="Picture 14" descr="A graph with blue and orange lines&#10;&#10;Description automatically generated">
+            <a:extLst>
+              <a:ext uri="{FF2B5EF4-FFF2-40B4-BE49-F238E27FC236}">
+                <a16:creationId xmlns:a16="http://schemas.microsoft.com/office/drawing/2014/main" id="{5BB9DD5D-A4F9-F662-FF40-A40C9457B778}"/>
+              </a:ext>
+            </a:extLst>
+          </p:cNvPr>
+          <p:cNvPicPr>
+            <a:picLocks noChangeAspect="1"/>
+          </p:cNvPicPr>
+          <p:nvPr/>
+        </p:nvPicPr>
+        <p:blipFill>
+          <a:blip r:embed="rId6"/>
+          <a:stretch>
+            <a:fillRect/>
+          </a:stretch>
+        </p:blipFill>
+        <p:spPr>
+          <a:xfrm>
+            <a:off x="5047871" y="715057"/>
+            <a:ext cx="2857598" cy="2219560"/>
+          </a:xfrm>
+          <a:prstGeom prst="rect">
+            <a:avLst/>
+          </a:prstGeom>
+        </p:spPr>
+      </p:pic>
+    </p:spTree>
+    <p:extLst>
+      <p:ext uri="{BB962C8B-B14F-4D97-AF65-F5344CB8AC3E}">
+        <p14:creationId xmlns:p14="http://schemas.microsoft.com/office/powerpoint/2010/main" val="2703077859"/>
+      </p:ext>
+    </p:extLst>
+  </p:cSld>
+  <p:clrMapOvr>
+    <a:masterClrMapping/>
+  </p:clrMapOvr>
+</p:sld>
+</file>
+
+<file path=ppt/slides/slide11.xml><?xml version="1.0" encoding="utf-8"?>
+<p:sld xmlns:a="http://schemas.openxmlformats.org/drawingml/2006/main" xmlns:r="http://schemas.openxmlformats.org/officeDocument/2006/relationships" xmlns:p="http://schemas.openxmlformats.org/presentationml/2006/main">
+  <p:cSld>
+    <p:spTree>
+      <p:nvGrpSpPr>
+        <p:cNvPr id="1" name=""/>
+        <p:cNvGrpSpPr/>
+        <p:nvPr/>
+      </p:nvGrpSpPr>
+      <p:grpSpPr>
+        <a:xfrm>
+          <a:off x="0" y="0"/>
+          <a:ext cx="0" cy="0"/>
+          <a:chOff x="0" y="0"/>
+          <a:chExt cx="0" cy="0"/>
+        </a:xfrm>
+      </p:grpSpPr>
+      <p:sp>
+        <p:nvSpPr>
+          <p:cNvPr id="2" name="Slide Number Placeholder 1">
+            <a:extLst>
+              <a:ext uri="{FF2B5EF4-FFF2-40B4-BE49-F238E27FC236}">
+                <a16:creationId xmlns:a16="http://schemas.microsoft.com/office/drawing/2014/main" id="{C3876B54-91C7-4CA0-981B-0280BE7EB7E4}"/>
+              </a:ext>
+            </a:extLst>
+          </p:cNvPr>
+          <p:cNvSpPr>
+            <a:spLocks noGrp="1"/>
+          </p:cNvSpPr>
+          <p:nvPr>
+            <p:ph type="sldNum" sz="quarter" idx="4"/>
+          </p:nvPr>
+        </p:nvSpPr>
+        <p:spPr/>
+        <p:txBody>
+          <a:bodyPr/>
+          <a:lstStyle/>
+          <a:p>
+            <a:r>
+              <a:rPr lang="en-US"/>
+              <a:t>Presented by DHS | </a:t>
+            </a:r>
+            <a:fld id="{8997B844-ACA2-A34A-B180-F01E98B0D70C}" type="slidenum">
+              <a:rPr lang="en-US" smtClean="0"/>
+              <a:pPr/>
+              <a:t>11</a:t>
             </a:fld>
             <a:endParaRPr lang="en-US" dirty="0"/>
           </a:p>
@@ -4008,12 +4239,12 @@
           <a:graphicData uri="http://schemas.openxmlformats.org/presentationml/2006/ole">
             <mc:AlternateContent xmlns:mc="http://schemas.openxmlformats.org/markup-compatibility/2006">
               <mc:Choice xmlns:v="urn:schemas-microsoft-com:vml" Requires="v">
-                <p:oleObj spid="_x0000_s4170" name="Bitmap Image" r:id="rId4" imgW="7728120" imgH="9226440" progId="Paint.Picture.1">
+                <p:oleObj name="Bitmap Image" r:id="rId3" imgW="7728120" imgH="9226440" progId="Paint.Picture.1">
                   <p:embed/>
                 </p:oleObj>
               </mc:Choice>
               <mc:Fallback>
-                <p:oleObj name="Bitmap Image" r:id="rId4" imgW="7728120" imgH="9226440" progId="Paint.Picture.1">
+                <p:oleObj name="Bitmap Image" r:id="rId3" imgW="7728120" imgH="9226440" progId="Paint.Picture.1">
                   <p:embed/>
                   <p:pic>
                     <p:nvPicPr>
@@ -4028,7 +4259,7 @@
                       <p:nvPr/>
                     </p:nvPicPr>
                     <p:blipFill>
-                      <a:blip r:embed="rId5">
+                      <a:blip r:embed="rId4">
                         <a:alphaModFix amt="10000"/>
                       </a:blip>
                       <a:stretch>
@@ -4073,12 +4304,12 @@
           <a:graphicData uri="http://schemas.openxmlformats.org/presentationml/2006/ole">
             <mc:AlternateContent xmlns:mc="http://schemas.openxmlformats.org/markup-compatibility/2006">
               <mc:Choice xmlns:v="urn:schemas-microsoft-com:vml" Requires="v">
-                <p:oleObj spid="_x0000_s4171" name="Bitmap Image" r:id="rId6" imgW="6921360" imgH="3054240" progId="Paint.Picture.1">
+                <p:oleObj name="Bitmap Image" r:id="rId5" imgW="6921360" imgH="3054240" progId="Paint.Picture.1">
                   <p:embed/>
                 </p:oleObj>
               </mc:Choice>
               <mc:Fallback>
-                <p:oleObj name="Bitmap Image" r:id="rId6" imgW="6921360" imgH="3054240" progId="Paint.Picture.1">
+                <p:oleObj name="Bitmap Image" r:id="rId5" imgW="6921360" imgH="3054240" progId="Paint.Picture.1">
                   <p:embed/>
                   <p:pic>
                     <p:nvPicPr>
@@ -4093,7 +4324,7 @@
                       <p:nvPr/>
                     </p:nvPicPr>
                     <p:blipFill>
-                      <a:blip r:embed="rId7">
+                      <a:blip r:embed="rId6">
                         <a:alphaModFix amt="20000"/>
                       </a:blip>
                       <a:stretch>
@@ -4298,12 +4529,12 @@
           <a:graphicData uri="http://schemas.openxmlformats.org/presentationml/2006/ole">
             <mc:AlternateContent xmlns:mc="http://schemas.openxmlformats.org/markup-compatibility/2006">
               <mc:Choice xmlns:v="urn:schemas-microsoft-com:vml" Requires="v">
-                <p:oleObj spid="_x0000_s4172" name="Bitmap Image" r:id="rId8" imgW="7677000" imgH="3397320" progId="Paint.Picture.1">
+                <p:oleObj name="Bitmap Image" r:id="rId7" imgW="7677000" imgH="3397320" progId="Paint.Picture.1">
                   <p:embed/>
                 </p:oleObj>
               </mc:Choice>
               <mc:Fallback>
-                <p:oleObj name="Bitmap Image" r:id="rId8" imgW="7677000" imgH="3397320" progId="Paint.Picture.1">
+                <p:oleObj name="Bitmap Image" r:id="rId7" imgW="7677000" imgH="3397320" progId="Paint.Picture.1">
                   <p:embed/>
                   <p:pic>
                     <p:nvPicPr>
@@ -4318,7 +4549,7 @@
                       <p:nvPr/>
                     </p:nvPicPr>
                     <p:blipFill>
-                      <a:blip r:embed="rId9">
+                      <a:blip r:embed="rId8">
                         <a:alphaModFix amt="20000"/>
                       </a:blip>
                       <a:stretch>
@@ -4537,7 +4768,7 @@
           <p:nvPr/>
         </p:nvPicPr>
         <p:blipFill rotWithShape="1">
-          <a:blip r:embed="rId10"/>
+          <a:blip r:embed="rId9"/>
           <a:srcRect t="7724" r="4478"/>
           <a:stretch/>
         </p:blipFill>
@@ -4653,7 +4884,7 @@
 </p:sld>
 </file>
 
-<file path=ppt/slides/slide11.xml><?xml version="1.0" encoding="utf-8"?>
+<file path=ppt/slides/slide12.xml><?xml version="1.0" encoding="utf-8"?>
 <p:sld xmlns:a="http://schemas.openxmlformats.org/drawingml/2006/main" xmlns:r="http://schemas.openxmlformats.org/officeDocument/2006/relationships" xmlns:p="http://schemas.openxmlformats.org/presentationml/2006/main">
   <p:cSld>
     <p:spTree>
@@ -4698,7 +4929,7 @@
             <a:fld id="{8997B844-ACA2-A34A-B180-F01E98B0D70C}" type="slidenum">
               <a:rPr lang="en-US" smtClean="0"/>
               <a:pPr/>
-              <a:t>11</a:t>
+              <a:t>12</a:t>
             </a:fld>
             <a:endParaRPr lang="en-US" dirty="0"/>
           </a:p>
@@ -4765,6 +4996,347 @@
           </a:prstGeom>
         </p:spPr>
       </p:pic>
+      <p:cxnSp>
+        <p:nvCxnSpPr>
+          <p:cNvPr id="5" name="Straight Arrow Connector 4">
+            <a:extLst>
+              <a:ext uri="{FF2B5EF4-FFF2-40B4-BE49-F238E27FC236}">
+                <a16:creationId xmlns:a16="http://schemas.microsoft.com/office/drawing/2014/main" id="{9DF90FC0-7152-1904-3C76-7397656848D4}"/>
+              </a:ext>
+            </a:extLst>
+          </p:cNvPr>
+          <p:cNvCxnSpPr>
+            <a:cxnSpLocks/>
+          </p:cNvCxnSpPr>
+          <p:nvPr/>
+        </p:nvCxnSpPr>
+        <p:spPr>
+          <a:xfrm>
+            <a:off x="2983832" y="1350829"/>
+            <a:ext cx="733268" cy="0"/>
+          </a:xfrm>
+          <a:prstGeom prst="straightConnector1">
+            <a:avLst/>
+          </a:prstGeom>
+          <a:ln>
+            <a:solidFill>
+              <a:srgbClr val="0070C0"/>
+            </a:solidFill>
+            <a:tailEnd type="triangle"/>
+          </a:ln>
+        </p:spPr>
+        <p:style>
+          <a:lnRef idx="2">
+            <a:schemeClr val="accent1"/>
+          </a:lnRef>
+          <a:fillRef idx="0">
+            <a:schemeClr val="accent1"/>
+          </a:fillRef>
+          <a:effectRef idx="1">
+            <a:schemeClr val="accent1"/>
+          </a:effectRef>
+          <a:fontRef idx="minor">
+            <a:schemeClr val="tx1"/>
+          </a:fontRef>
+        </p:style>
+      </p:cxnSp>
+      <p:sp>
+        <p:nvSpPr>
+          <p:cNvPr id="9" name="TextBox 8">
+            <a:extLst>
+              <a:ext uri="{FF2B5EF4-FFF2-40B4-BE49-F238E27FC236}">
+                <a16:creationId xmlns:a16="http://schemas.microsoft.com/office/drawing/2014/main" id="{F7EEFAA5-AB96-BD70-D600-FC399C99CC6D}"/>
+              </a:ext>
+            </a:extLst>
+          </p:cNvPr>
+          <p:cNvSpPr txBox="1"/>
+          <p:nvPr/>
+        </p:nvSpPr>
+        <p:spPr>
+          <a:xfrm>
+            <a:off x="792869" y="1196940"/>
+            <a:ext cx="1204978" cy="307777"/>
+          </a:xfrm>
+          <a:prstGeom prst="rect">
+            <a:avLst/>
+          </a:prstGeom>
+          <a:noFill/>
+        </p:spPr>
+        <p:txBody>
+          <a:bodyPr wrap="square">
+            <a:spAutoFit/>
+          </a:bodyPr>
+          <a:lstStyle/>
+          <a:p>
+            <a:r>
+              <a:rPr lang="en-US" sz="1400" dirty="0">
+                <a:solidFill>
+                  <a:schemeClr val="tx1">
+                    <a:lumMod val="50000"/>
+                  </a:schemeClr>
+                </a:solidFill>
+                <a:latin typeface="Calibri" panose="020F0502020204030204" pitchFamily="34" charset="0"/>
+                <a:cs typeface="Calibri" panose="020F0502020204030204" pitchFamily="34" charset="0"/>
+              </a:rPr>
+              <a:t>1. Submit CSV</a:t>
+            </a:r>
+          </a:p>
+        </p:txBody>
+      </p:sp>
+      <p:sp>
+        <p:nvSpPr>
+          <p:cNvPr id="11" name="TextBox 10">
+            <a:extLst>
+              <a:ext uri="{FF2B5EF4-FFF2-40B4-BE49-F238E27FC236}">
+                <a16:creationId xmlns:a16="http://schemas.microsoft.com/office/drawing/2014/main" id="{265F9618-F059-6A60-DE28-032D2CF2BCA0}"/>
+              </a:ext>
+            </a:extLst>
+          </p:cNvPr>
+          <p:cNvSpPr txBox="1"/>
+          <p:nvPr/>
+        </p:nvSpPr>
+        <p:spPr>
+          <a:xfrm>
+            <a:off x="311570" y="1686565"/>
+            <a:ext cx="1686277" cy="307777"/>
+          </a:xfrm>
+          <a:prstGeom prst="rect">
+            <a:avLst/>
+          </a:prstGeom>
+          <a:noFill/>
+        </p:spPr>
+        <p:txBody>
+          <a:bodyPr wrap="square">
+            <a:spAutoFit/>
+          </a:bodyPr>
+          <a:lstStyle/>
+          <a:p>
+            <a:r>
+              <a:rPr lang="en-US" sz="1400" dirty="0">
+                <a:solidFill>
+                  <a:schemeClr val="tx1">
+                    <a:lumMod val="50000"/>
+                  </a:schemeClr>
+                </a:solidFill>
+                <a:latin typeface="Calibri" panose="020F0502020204030204" pitchFamily="34" charset="0"/>
+                <a:cs typeface="Calibri" panose="020F0502020204030204" pitchFamily="34" charset="0"/>
+              </a:rPr>
+              <a:t>2. Check data format</a:t>
+            </a:r>
+          </a:p>
+        </p:txBody>
+      </p:sp>
+      <p:sp>
+        <p:nvSpPr>
+          <p:cNvPr id="12" name="TextBox 11">
+            <a:extLst>
+              <a:ext uri="{FF2B5EF4-FFF2-40B4-BE49-F238E27FC236}">
+                <a16:creationId xmlns:a16="http://schemas.microsoft.com/office/drawing/2014/main" id="{8D59AE76-8357-11BF-EA3B-E49FAC394E0B}"/>
+              </a:ext>
+            </a:extLst>
+          </p:cNvPr>
+          <p:cNvSpPr txBox="1"/>
+          <p:nvPr/>
+        </p:nvSpPr>
+        <p:spPr>
+          <a:xfrm>
+            <a:off x="281882" y="2545609"/>
+            <a:ext cx="1745654" cy="307777"/>
+          </a:xfrm>
+          <a:prstGeom prst="rect">
+            <a:avLst/>
+          </a:prstGeom>
+          <a:noFill/>
+        </p:spPr>
+        <p:txBody>
+          <a:bodyPr wrap="square">
+            <a:spAutoFit/>
+          </a:bodyPr>
+          <a:lstStyle/>
+          <a:p>
+            <a:r>
+              <a:rPr lang="en-US" sz="1400" dirty="0">
+                <a:solidFill>
+                  <a:schemeClr val="tx1">
+                    <a:lumMod val="50000"/>
+                  </a:schemeClr>
+                </a:solidFill>
+                <a:latin typeface="Calibri" panose="020F0502020204030204" pitchFamily="34" charset="0"/>
+                <a:cs typeface="Calibri" panose="020F0502020204030204" pitchFamily="34" charset="0"/>
+              </a:rPr>
+              <a:t>3. Assess compliance</a:t>
+            </a:r>
+          </a:p>
+        </p:txBody>
+      </p:sp>
+      <p:sp>
+        <p:nvSpPr>
+          <p:cNvPr id="13" name="TextBox 12">
+            <a:extLst>
+              <a:ext uri="{FF2B5EF4-FFF2-40B4-BE49-F238E27FC236}">
+                <a16:creationId xmlns:a16="http://schemas.microsoft.com/office/drawing/2014/main" id="{6D4ED97E-999D-F742-6447-76FA89F03F11}"/>
+              </a:ext>
+            </a:extLst>
+          </p:cNvPr>
+          <p:cNvSpPr txBox="1"/>
+          <p:nvPr/>
+        </p:nvSpPr>
+        <p:spPr>
+          <a:xfrm>
+            <a:off x="7183965" y="2268610"/>
+            <a:ext cx="1856907" cy="1169551"/>
+          </a:xfrm>
+          <a:prstGeom prst="rect">
+            <a:avLst/>
+          </a:prstGeom>
+          <a:noFill/>
+        </p:spPr>
+        <p:txBody>
+          <a:bodyPr wrap="square">
+            <a:spAutoFit/>
+          </a:bodyPr>
+          <a:lstStyle/>
+          <a:p>
+            <a:r>
+              <a:rPr lang="en-US" sz="1400" dirty="0">
+                <a:latin typeface="Calibri" panose="020F0502020204030204" pitchFamily="34" charset="0"/>
+                <a:cs typeface="Calibri" panose="020F0502020204030204" pitchFamily="34" charset="0"/>
+              </a:rPr>
+              <a:t>(</a:t>
+            </a:r>
+            <a:r>
+              <a:rPr lang="en-US" sz="1400" dirty="0">
+                <a:solidFill>
+                  <a:schemeClr val="accent3"/>
+                </a:solidFill>
+                <a:latin typeface="Calibri" panose="020F0502020204030204" pitchFamily="34" charset="0"/>
+                <a:cs typeface="Calibri" panose="020F0502020204030204" pitchFamily="34" charset="0"/>
+              </a:rPr>
+              <a:t>0.9879</a:t>
+            </a:r>
+            <a:r>
+              <a:rPr lang="en-US" sz="1400" dirty="0">
+                <a:latin typeface="Calibri" panose="020F0502020204030204" pitchFamily="34" charset="0"/>
+                <a:cs typeface="Calibri" panose="020F0502020204030204" pitchFamily="34" charset="0"/>
+              </a:rPr>
+              <a:t> + </a:t>
+            </a:r>
+            <a:r>
+              <a:rPr lang="en-US" sz="1400" dirty="0">
+                <a:solidFill>
+                  <a:schemeClr val="accent3"/>
+                </a:solidFill>
+                <a:latin typeface="Calibri" panose="020F0502020204030204" pitchFamily="34" charset="0"/>
+                <a:cs typeface="Calibri" panose="020F0502020204030204" pitchFamily="34" charset="0"/>
+              </a:rPr>
+              <a:t>0.98572</a:t>
+            </a:r>
+            <a:r>
+              <a:rPr lang="en-US" sz="1400" dirty="0">
+                <a:latin typeface="Calibri" panose="020F0502020204030204" pitchFamily="34" charset="0"/>
+                <a:cs typeface="Calibri" panose="020F0502020204030204" pitchFamily="34" charset="0"/>
+              </a:rPr>
+              <a:t> + </a:t>
+            </a:r>
+            <a:r>
+              <a:rPr lang="en-US" sz="1400" dirty="0">
+                <a:solidFill>
+                  <a:schemeClr val="accent3"/>
+                </a:solidFill>
+                <a:latin typeface="Calibri" panose="020F0502020204030204" pitchFamily="34" charset="0"/>
+                <a:cs typeface="Calibri" panose="020F0502020204030204" pitchFamily="34" charset="0"/>
+              </a:rPr>
+              <a:t>0.97502</a:t>
+            </a:r>
+            <a:r>
+              <a:rPr lang="en-US" sz="1400" dirty="0">
+                <a:latin typeface="Calibri" panose="020F0502020204030204" pitchFamily="34" charset="0"/>
+                <a:cs typeface="Calibri" panose="020F0502020204030204" pitchFamily="34" charset="0"/>
+              </a:rPr>
+              <a:t> + </a:t>
+            </a:r>
+            <a:r>
+              <a:rPr lang="en-US" sz="1400" dirty="0">
+                <a:solidFill>
+                  <a:schemeClr val="accent3"/>
+                </a:solidFill>
+                <a:latin typeface="Calibri" panose="020F0502020204030204" pitchFamily="34" charset="0"/>
+                <a:cs typeface="Calibri" panose="020F0502020204030204" pitchFamily="34" charset="0"/>
+              </a:rPr>
+              <a:t>0.96188</a:t>
+            </a:r>
+            <a:r>
+              <a:rPr lang="en-US" sz="1400" dirty="0">
+                <a:latin typeface="Calibri" panose="020F0502020204030204" pitchFamily="34" charset="0"/>
+                <a:cs typeface="Calibri" panose="020F0502020204030204" pitchFamily="34" charset="0"/>
+              </a:rPr>
+              <a:t>) / 4</a:t>
+            </a:r>
+          </a:p>
+          <a:p>
+            <a:endParaRPr lang="en-US" sz="1400" i="1" dirty="0">
+              <a:solidFill>
+                <a:schemeClr val="accent3"/>
+              </a:solidFill>
+              <a:latin typeface="Calibri" panose="020F0502020204030204" pitchFamily="34" charset="0"/>
+              <a:cs typeface="Calibri" panose="020F0502020204030204" pitchFamily="34" charset="0"/>
+            </a:endParaRPr>
+          </a:p>
+          <a:p>
+            <a:r>
+              <a:rPr lang="en-US" sz="1400" i="1" dirty="0">
+                <a:solidFill>
+                  <a:schemeClr val="accent3"/>
+                </a:solidFill>
+                <a:latin typeface="Calibri" panose="020F0502020204030204" pitchFamily="34" charset="0"/>
+                <a:cs typeface="Calibri" panose="020F0502020204030204" pitchFamily="34" charset="0"/>
+              </a:rPr>
+              <a:t>0.97763</a:t>
+            </a:r>
+            <a:r>
+              <a:rPr lang="en-US" sz="1400" i="1" dirty="0">
+                <a:latin typeface="Calibri" panose="020F0502020204030204" pitchFamily="34" charset="0"/>
+                <a:cs typeface="Calibri" panose="020F0502020204030204" pitchFamily="34" charset="0"/>
+              </a:rPr>
+              <a:t> &gt; </a:t>
+            </a:r>
+            <a:r>
+              <a:rPr lang="en-US" sz="1400" i="1" dirty="0">
+                <a:solidFill>
+                  <a:schemeClr val="accent2"/>
+                </a:solidFill>
+                <a:latin typeface="Calibri" panose="020F0502020204030204" pitchFamily="34" charset="0"/>
+                <a:cs typeface="Calibri" panose="020F0502020204030204" pitchFamily="34" charset="0"/>
+              </a:rPr>
+              <a:t>0.70</a:t>
+            </a:r>
+            <a:r>
+              <a:rPr lang="en-US" sz="1400" i="1" dirty="0">
+                <a:latin typeface="Calibri" panose="020F0502020204030204" pitchFamily="34" charset="0"/>
+                <a:cs typeface="Calibri" panose="020F0502020204030204" pitchFamily="34" charset="0"/>
+              </a:rPr>
+              <a:t> </a:t>
+            </a:r>
+            <a:r>
+              <a:rPr lang="en-US" sz="1400" dirty="0">
+                <a:latin typeface="Calibri" panose="020F0502020204030204" pitchFamily="34" charset="0"/>
+                <a:cs typeface="Calibri" panose="020F0502020204030204" pitchFamily="34" charset="0"/>
+              </a:rPr>
+              <a:t>= </a:t>
+            </a:r>
+            <a:r>
+              <a:rPr lang="en-US" sz="1400" dirty="0">
+                <a:solidFill>
+                  <a:schemeClr val="accent3"/>
+                </a:solidFill>
+                <a:latin typeface="Calibri" panose="020F0502020204030204" pitchFamily="34" charset="0"/>
+                <a:cs typeface="Calibri" panose="020F0502020204030204" pitchFamily="34" charset="0"/>
+              </a:rPr>
+              <a:t>Compliant</a:t>
+            </a:r>
+          </a:p>
+        </p:txBody>
+      </p:sp>
     </p:spTree>
     <p:extLst>
       <p:ext uri="{BB962C8B-B14F-4D97-AF65-F5344CB8AC3E}">
@@ -4778,7 +5350,7 @@
 </p:sld>
 </file>
 
-<file path=ppt/slides/slide12.xml><?xml version="1.0" encoding="utf-8"?>
+<file path=ppt/slides/slide13.xml><?xml version="1.0" encoding="utf-8"?>
 <p:sld xmlns:a="http://schemas.openxmlformats.org/drawingml/2006/main" xmlns:r="http://schemas.openxmlformats.org/officeDocument/2006/relationships" xmlns:p="http://schemas.openxmlformats.org/presentationml/2006/main">
   <p:cSld>
     <p:spTree>
@@ -4823,7 +5395,7 @@
             <a:fld id="{8997B844-ACA2-A34A-B180-F01E98B0D70C}" type="slidenum">
               <a:rPr lang="en-US" smtClean="0"/>
               <a:pPr/>
-              <a:t>12</a:t>
+              <a:t>13</a:t>
             </a:fld>
             <a:endParaRPr lang="en-US" dirty="0"/>
           </a:p>
@@ -4953,12 +5525,12 @@
             </a:r>
           </a:p>
           <a:p>
-            <a:pPr marL="457200" indent="-457200">
+            <a:pPr marL="914400" lvl="1" indent="-457200">
               <a:lnSpc>
                 <a:spcPct val="150000"/>
               </a:lnSpc>
-              <a:buFont typeface="+mj-lt"/>
-              <a:buAutoNum type="arabicPeriod"/>
+              <a:buFont typeface="Arial" panose="020B0604020202020204" pitchFamily="34" charset="0"/>
+              <a:buChar char="•"/>
             </a:pPr>
             <a:r>
               <a:rPr lang="en-US" sz="2000" dirty="0">
@@ -5097,7 +5669,7 @@
         <p:spPr>
           <a:xfrm>
             <a:off x="71376" y="870384"/>
-            <a:ext cx="8906369" cy="3724096"/>
+            <a:ext cx="8906369" cy="2999283"/>
           </a:xfrm>
           <a:prstGeom prst="rect">
             <a:avLst/>
@@ -5111,6 +5683,9 @@
           <a:lstStyle/>
           <a:p>
             <a:pPr marL="342900" indent="-342900">
+              <a:lnSpc>
+                <a:spcPct val="150000"/>
+              </a:lnSpc>
               <a:buFont typeface="Arial" panose="020B0604020202020204" pitchFamily="34" charset="0"/>
               <a:buChar char="•"/>
             </a:pPr>
@@ -5119,44 +5694,43 @@
                 <a:solidFill>
                   <a:srgbClr val="0070C0"/>
                 </a:solidFill>
-                <a:latin typeface="Arial" panose="020B0604020202020204" pitchFamily="34" charset="0"/>
-                <a:cs typeface="Arial" panose="020B0604020202020204" pitchFamily="34" charset="0"/>
+                <a:latin typeface="Calibri" panose="020F0502020204030204" pitchFamily="34" charset="0"/>
+                <a:cs typeface="Calibri" panose="020F0502020204030204" pitchFamily="34" charset="0"/>
               </a:rPr>
               <a:t>What is the problem? </a:t>
             </a:r>
-            <a:r>
-              <a:rPr lang="en-US" dirty="0">
-                <a:latin typeface="Arial" panose="020B0604020202020204" pitchFamily="34" charset="0"/>
-                <a:cs typeface="Arial" panose="020B0604020202020204" pitchFamily="34" charset="0"/>
-              </a:rPr>
-              <a:t>No mechanisms exists for documenting, scoring, or determining compliance of AI/ML use-cases against the GAO AI Accountability Framework</a:t>
-            </a:r>
-          </a:p>
-          <a:p>
-            <a:pPr marL="342900" indent="-342900">
+          </a:p>
+          <a:p>
+            <a:pPr marL="742950" lvl="1" indent="-285750">
+              <a:lnSpc>
+                <a:spcPct val="150000"/>
+              </a:lnSpc>
               <a:buFont typeface="Arial" panose="020B0604020202020204" pitchFamily="34" charset="0"/>
               <a:buChar char="•"/>
             </a:pPr>
+            <a:r>
+              <a:rPr lang="en-US" dirty="0">
+                <a:latin typeface="Calibri" panose="020F0502020204030204" pitchFamily="34" charset="0"/>
+                <a:cs typeface="Calibri" panose="020F0502020204030204" pitchFamily="34" charset="0"/>
+              </a:rPr>
+              <a:t>GAO audits DHS AI/ML use-cases based on the GAO AI Accountability Framework –– but how is this done?</a:t>
+            </a:r>
             <a:r>
               <a:rPr lang="en-US" b="1" dirty="0">
                 <a:solidFill>
                   <a:srgbClr val="0070C0"/>
                 </a:solidFill>
-                <a:latin typeface="Arial" panose="020B0604020202020204" pitchFamily="34" charset="0"/>
-                <a:cs typeface="Arial" panose="020B0604020202020204" pitchFamily="34" charset="0"/>
+                <a:latin typeface="Calibri" panose="020F0502020204030204" pitchFamily="34" charset="0"/>
+                <a:cs typeface="Calibri" panose="020F0502020204030204" pitchFamily="34" charset="0"/>
               </a:rPr>
-              <a:t>Why is this problem important? </a:t>
-            </a:r>
-            <a:r>
-              <a:rPr lang="en-US" dirty="0">
-                <a:latin typeface="Arial" panose="020B0604020202020204" pitchFamily="34" charset="0"/>
-                <a:cs typeface="Arial" panose="020B0604020202020204" pitchFamily="34" charset="0"/>
-              </a:rPr>
-              <a:t>GAO conducts audits of DHS AI/ML use-cases based on the GAO AI Accountability Framework</a:t>
-            </a:r>
-          </a:p>
-          <a:p>
-            <a:pPr marL="342900" indent="-342900">
+              <a:t> </a:t>
+            </a:r>
+          </a:p>
+          <a:p>
+            <a:pPr marL="285750" indent="-285750">
+              <a:lnSpc>
+                <a:spcPct val="150000"/>
+              </a:lnSpc>
               <a:buFont typeface="Arial" panose="020B0604020202020204" pitchFamily="34" charset="0"/>
               <a:buChar char="•"/>
             </a:pPr>
@@ -5165,100 +5739,42 @@
                 <a:solidFill>
                   <a:srgbClr val="0070C0"/>
                 </a:solidFill>
-                <a:latin typeface="Arial" panose="020B0604020202020204" pitchFamily="34" charset="0"/>
-                <a:cs typeface="Arial" panose="020B0604020202020204" pitchFamily="34" charset="0"/>
+                <a:latin typeface="Calibri" panose="020F0502020204030204" pitchFamily="34" charset="0"/>
+                <a:cs typeface="Calibri" panose="020F0502020204030204" pitchFamily="34" charset="0"/>
               </a:rPr>
-              <a:t>What is the proposed solution?</a:t>
-            </a:r>
-            <a:r>
-              <a:rPr lang="en-US" dirty="0">
-                <a:solidFill>
-                  <a:srgbClr val="0070C0"/>
-                </a:solidFill>
-                <a:latin typeface="Arial" panose="020B0604020202020204" pitchFamily="34" charset="0"/>
-                <a:cs typeface="Arial" panose="020B0604020202020204" pitchFamily="34" charset="0"/>
-              </a:rPr>
-              <a:t> </a:t>
-            </a:r>
-            <a:r>
-              <a:rPr lang="en-US" dirty="0">
-                <a:latin typeface="Arial" panose="020B0604020202020204" pitchFamily="34" charset="0"/>
-                <a:cs typeface="Arial" panose="020B0604020202020204" pitchFamily="34" charset="0"/>
-              </a:rPr>
-              <a:t>Develop a tool that (1) allows AI/ML use-case owners to submit their self-defined GAO principles scores and (2) computes an overall compliance score for an AI/ML use-case. </a:t>
-            </a:r>
-            <a:endParaRPr lang="en-US" b="1" dirty="0">
-              <a:latin typeface="Arial" panose="020B0604020202020204" pitchFamily="34" charset="0"/>
-              <a:cs typeface="Arial" panose="020B0604020202020204" pitchFamily="34" charset="0"/>
+              <a:t>Why is this problem important? </a:t>
+            </a:r>
+            <a:endParaRPr lang="en-US" dirty="0">
+              <a:latin typeface="Calibri" panose="020F0502020204030204" pitchFamily="34" charset="0"/>
+              <a:cs typeface="Calibri" panose="020F0502020204030204" pitchFamily="34" charset="0"/>
             </a:endParaRPr>
           </a:p>
           <a:p>
-            <a:pPr marL="342900" indent="-342900">
+            <a:pPr marL="742950" lvl="1" indent="-285750">
+              <a:lnSpc>
+                <a:spcPct val="150000"/>
+              </a:lnSpc>
               <a:buFont typeface="Arial" panose="020B0604020202020204" pitchFamily="34" charset="0"/>
               <a:buChar char="•"/>
             </a:pPr>
             <a:r>
-              <a:rPr lang="en-US" b="1" dirty="0">
-                <a:solidFill>
-                  <a:srgbClr val="0070C0"/>
-                </a:solidFill>
-                <a:latin typeface="Arial" panose="020B0604020202020204" pitchFamily="34" charset="0"/>
-                <a:cs typeface="Arial" panose="020B0604020202020204" pitchFamily="34" charset="0"/>
+              <a:rPr lang="en-US" dirty="0">
+                <a:latin typeface="Calibri" panose="020F0502020204030204" pitchFamily="34" charset="0"/>
+                <a:cs typeface="Calibri" panose="020F0502020204030204" pitchFamily="34" charset="0"/>
               </a:rPr>
-              <a:t>What is the potential impact of the solution?</a:t>
-            </a:r>
-          </a:p>
-          <a:p>
-            <a:pPr marL="800100" lvl="1" indent="-342900">
-              <a:buFont typeface="Arial" panose="020B0604020202020204" pitchFamily="34" charset="0"/>
-              <a:buChar char="•"/>
+              <a:t>No mechanisms exist for documenting, scoring, or determining compliance of AI/ML use-cases against the GAO AI Accountability Framework</a:t>
+            </a:r>
+          </a:p>
+          <a:p>
+            <a:pPr>
+              <a:lnSpc>
+                <a:spcPct val="150000"/>
+              </a:lnSpc>
             </a:pPr>
-            <a:r>
-              <a:rPr lang="en-US" dirty="0">
-                <a:latin typeface="Arial" panose="020B0604020202020204" pitchFamily="34" charset="0"/>
-                <a:cs typeface="Arial" panose="020B0604020202020204" pitchFamily="34" charset="0"/>
-              </a:rPr>
-              <a:t>Quick determination of GAO Framework compliance</a:t>
-            </a:r>
-          </a:p>
-          <a:p>
-            <a:pPr marL="800100" lvl="1" indent="-342900">
-              <a:buFont typeface="Arial" panose="020B0604020202020204" pitchFamily="34" charset="0"/>
-              <a:buChar char="•"/>
-            </a:pPr>
-            <a:r>
-              <a:rPr lang="en-US" dirty="0">
-                <a:latin typeface="Arial" panose="020B0604020202020204" pitchFamily="34" charset="0"/>
-                <a:cs typeface="Arial" panose="020B0604020202020204" pitchFamily="34" charset="0"/>
-              </a:rPr>
-              <a:t>Streamline the scoring and compliance process for use-case owners</a:t>
-            </a:r>
-          </a:p>
-          <a:p>
-            <a:pPr marL="800100" lvl="1" indent="-342900">
-              <a:buFont typeface="Arial" panose="020B0604020202020204" pitchFamily="34" charset="0"/>
-              <a:buChar char="•"/>
-            </a:pPr>
-            <a:r>
-              <a:rPr lang="en-US" dirty="0">
-                <a:latin typeface="Arial" panose="020B0604020202020204" pitchFamily="34" charset="0"/>
-                <a:cs typeface="Arial" panose="020B0604020202020204" pitchFamily="34" charset="0"/>
-              </a:rPr>
-              <a:t>Surfaces issues with the GAO AI Accountability Framework</a:t>
-            </a:r>
-          </a:p>
-          <a:p>
-            <a:pPr marL="800100" lvl="1" indent="-342900">
-              <a:buFont typeface="Arial" panose="020B0604020202020204" pitchFamily="34" charset="0"/>
-              <a:buChar char="•"/>
-            </a:pPr>
-            <a:r>
-              <a:rPr lang="en-US" sz="2000" dirty="0">
-                <a:latin typeface="Arial" panose="020B0604020202020204" pitchFamily="34" charset="0"/>
-                <a:cs typeface="Arial" panose="020B0604020202020204" pitchFamily="34" charset="0"/>
-              </a:rPr>
-              <a:t>Foster scoring/compliance standardization across federal government</a:t>
-            </a:r>
+            <a:endParaRPr lang="en-US" sz="2000" dirty="0">
+              <a:latin typeface="Calibri" panose="020F0502020204030204" pitchFamily="34" charset="0"/>
+              <a:cs typeface="Calibri" panose="020F0502020204030204" pitchFamily="34" charset="0"/>
+            </a:endParaRPr>
           </a:p>
         </p:txBody>
       </p:sp>
@@ -5314,13 +5830,293 @@
           <a:lstStyle/>
           <a:p>
             <a:r>
-              <a:rPr lang="en-US"/>
+              <a:rPr lang="en-US" dirty="0"/>
               <a:t>Presented by DHS | </a:t>
             </a:r>
             <a:fld id="{8997B844-ACA2-A34A-B180-F01E98B0D70C}" type="slidenum">
               <a:rPr lang="en-US" smtClean="0"/>
               <a:pPr/>
               <a:t>3</a:t>
+            </a:fld>
+            <a:endParaRPr lang="en-US" dirty="0"/>
+          </a:p>
+        </p:txBody>
+      </p:sp>
+      <p:sp>
+        <p:nvSpPr>
+          <p:cNvPr id="3" name="Title 2">
+            <a:extLst>
+              <a:ext uri="{FF2B5EF4-FFF2-40B4-BE49-F238E27FC236}">
+                <a16:creationId xmlns:a16="http://schemas.microsoft.com/office/drawing/2014/main" id="{9D6973F2-923D-4F4F-8A40-6D33454876B0}"/>
+              </a:ext>
+            </a:extLst>
+          </p:cNvPr>
+          <p:cNvSpPr>
+            <a:spLocks noGrp="1"/>
+          </p:cNvSpPr>
+          <p:nvPr>
+            <p:ph type="title"/>
+          </p:nvPr>
+        </p:nvSpPr>
+        <p:spPr/>
+        <p:txBody>
+          <a:bodyPr/>
+          <a:lstStyle/>
+          <a:p>
+            <a:r>
+              <a:rPr lang="en-US" dirty="0">
+                <a:solidFill>
+                  <a:schemeClr val="bg1"/>
+                </a:solidFill>
+              </a:rPr>
+              <a:t>Project Overview</a:t>
+            </a:r>
+          </a:p>
+        </p:txBody>
+      </p:sp>
+      <p:sp>
+        <p:nvSpPr>
+          <p:cNvPr id="11" name="TextBox 10">
+            <a:extLst>
+              <a:ext uri="{FF2B5EF4-FFF2-40B4-BE49-F238E27FC236}">
+                <a16:creationId xmlns:a16="http://schemas.microsoft.com/office/drawing/2014/main" id="{26DE8F54-E1A9-42A5-A756-24013CC28500}"/>
+              </a:ext>
+            </a:extLst>
+          </p:cNvPr>
+          <p:cNvSpPr txBox="1"/>
+          <p:nvPr/>
+        </p:nvSpPr>
+        <p:spPr>
+          <a:xfrm>
+            <a:off x="71376" y="870384"/>
+            <a:ext cx="8906369" cy="3365024"/>
+          </a:xfrm>
+          <a:prstGeom prst="rect">
+            <a:avLst/>
+          </a:prstGeom>
+          <a:noFill/>
+        </p:spPr>
+        <p:txBody>
+          <a:bodyPr wrap="square" rtlCol="0">
+            <a:spAutoFit/>
+          </a:bodyPr>
+          <a:lstStyle/>
+          <a:p>
+            <a:pPr marL="342900" indent="-342900">
+              <a:lnSpc>
+                <a:spcPct val="150000"/>
+              </a:lnSpc>
+              <a:buFont typeface="Arial" panose="020B0604020202020204" pitchFamily="34" charset="0"/>
+              <a:buChar char="•"/>
+            </a:pPr>
+            <a:r>
+              <a:rPr lang="en-US" b="1" dirty="0">
+                <a:solidFill>
+                  <a:srgbClr val="0070C0"/>
+                </a:solidFill>
+                <a:latin typeface="Calibri" panose="020F0502020204030204" pitchFamily="34" charset="0"/>
+                <a:cs typeface="Calibri" panose="020F0502020204030204" pitchFamily="34" charset="0"/>
+              </a:rPr>
+              <a:t>What is the proposed solution?</a:t>
+            </a:r>
+            <a:r>
+              <a:rPr lang="en-US" dirty="0">
+                <a:solidFill>
+                  <a:srgbClr val="0070C0"/>
+                </a:solidFill>
+                <a:latin typeface="Calibri" panose="020F0502020204030204" pitchFamily="34" charset="0"/>
+                <a:cs typeface="Calibri" panose="020F0502020204030204" pitchFamily="34" charset="0"/>
+              </a:rPr>
+              <a:t> </a:t>
+            </a:r>
+            <a:r>
+              <a:rPr lang="en-US" dirty="0">
+                <a:latin typeface="Calibri" panose="020F0502020204030204" pitchFamily="34" charset="0"/>
+                <a:cs typeface="Calibri" panose="020F0502020204030204" pitchFamily="34" charset="0"/>
+              </a:rPr>
+              <a:t>A tool that:</a:t>
+            </a:r>
+          </a:p>
+          <a:p>
+            <a:pPr marL="800100" lvl="1" indent="-342900">
+              <a:lnSpc>
+                <a:spcPct val="150000"/>
+              </a:lnSpc>
+              <a:buFont typeface="+mj-lt"/>
+              <a:buAutoNum type="arabicPeriod"/>
+            </a:pPr>
+            <a:r>
+              <a:rPr lang="en-US" dirty="0">
+                <a:latin typeface="Calibri" panose="020F0502020204030204" pitchFamily="34" charset="0"/>
+                <a:cs typeface="Calibri" panose="020F0502020204030204" pitchFamily="34" charset="0"/>
+              </a:rPr>
+              <a:t>Allows AI/ML use-case owners to submit self-defined GAO principles scores</a:t>
+            </a:r>
+          </a:p>
+          <a:p>
+            <a:pPr marL="800100" lvl="1" indent="-342900">
+              <a:lnSpc>
+                <a:spcPct val="150000"/>
+              </a:lnSpc>
+              <a:buFont typeface="+mj-lt"/>
+              <a:buAutoNum type="arabicPeriod"/>
+            </a:pPr>
+            <a:r>
+              <a:rPr lang="en-US" dirty="0">
+                <a:latin typeface="Calibri" panose="020F0502020204030204" pitchFamily="34" charset="0"/>
+                <a:cs typeface="Calibri" panose="020F0502020204030204" pitchFamily="34" charset="0"/>
+              </a:rPr>
+              <a:t>Computes an overall compliance score for an AI/ML use-case</a:t>
+            </a:r>
+            <a:endParaRPr lang="en-US" b="1" dirty="0">
+              <a:latin typeface="Calibri" panose="020F0502020204030204" pitchFamily="34" charset="0"/>
+              <a:cs typeface="Calibri" panose="020F0502020204030204" pitchFamily="34" charset="0"/>
+            </a:endParaRPr>
+          </a:p>
+          <a:p>
+            <a:pPr marL="342900" indent="-342900">
+              <a:lnSpc>
+                <a:spcPct val="150000"/>
+              </a:lnSpc>
+              <a:buFont typeface="Arial" panose="020B0604020202020204" pitchFamily="34" charset="0"/>
+              <a:buChar char="•"/>
+            </a:pPr>
+            <a:r>
+              <a:rPr lang="en-US" b="1" dirty="0">
+                <a:solidFill>
+                  <a:srgbClr val="0070C0"/>
+                </a:solidFill>
+                <a:latin typeface="Calibri" panose="020F0502020204030204" pitchFamily="34" charset="0"/>
+                <a:cs typeface="Calibri" panose="020F0502020204030204" pitchFamily="34" charset="0"/>
+              </a:rPr>
+              <a:t>What is the potential impact of the solution?</a:t>
+            </a:r>
+          </a:p>
+          <a:p>
+            <a:pPr marL="800100" lvl="1" indent="-342900">
+              <a:lnSpc>
+                <a:spcPct val="150000"/>
+              </a:lnSpc>
+              <a:buFont typeface="+mj-lt"/>
+              <a:buAutoNum type="arabicPeriod"/>
+            </a:pPr>
+            <a:r>
+              <a:rPr lang="en-US" dirty="0">
+                <a:latin typeface="Calibri" panose="020F0502020204030204" pitchFamily="34" charset="0"/>
+                <a:cs typeface="Calibri" panose="020F0502020204030204" pitchFamily="34" charset="0"/>
+              </a:rPr>
+              <a:t>Quick, more objective determination of GAO Framework compliance</a:t>
+            </a:r>
+          </a:p>
+          <a:p>
+            <a:pPr marL="800100" lvl="1" indent="-342900">
+              <a:lnSpc>
+                <a:spcPct val="150000"/>
+              </a:lnSpc>
+              <a:buFont typeface="+mj-lt"/>
+              <a:buAutoNum type="arabicPeriod"/>
+            </a:pPr>
+            <a:r>
+              <a:rPr lang="en-US" dirty="0">
+                <a:latin typeface="Calibri" panose="020F0502020204030204" pitchFamily="34" charset="0"/>
+                <a:cs typeface="Calibri" panose="020F0502020204030204" pitchFamily="34" charset="0"/>
+              </a:rPr>
+              <a:t>Streamline the scoring and compliance process for use-case owners</a:t>
+            </a:r>
+          </a:p>
+          <a:p>
+            <a:pPr marL="800100" lvl="1" indent="-342900">
+              <a:lnSpc>
+                <a:spcPct val="150000"/>
+              </a:lnSpc>
+              <a:buFont typeface="+mj-lt"/>
+              <a:buAutoNum type="arabicPeriod"/>
+            </a:pPr>
+            <a:r>
+              <a:rPr lang="en-US" dirty="0">
+                <a:latin typeface="Calibri" panose="020F0502020204030204" pitchFamily="34" charset="0"/>
+                <a:cs typeface="Calibri" panose="020F0502020204030204" pitchFamily="34" charset="0"/>
+              </a:rPr>
+              <a:t>Surfaces issues with the GAO AI Accountability Framework</a:t>
+            </a:r>
+          </a:p>
+          <a:p>
+            <a:pPr marL="800100" lvl="1" indent="-342900">
+              <a:lnSpc>
+                <a:spcPct val="150000"/>
+              </a:lnSpc>
+              <a:buFont typeface="+mj-lt"/>
+              <a:buAutoNum type="arabicPeriod"/>
+            </a:pPr>
+            <a:r>
+              <a:rPr lang="en-US" dirty="0">
+                <a:latin typeface="Calibri" panose="020F0502020204030204" pitchFamily="34" charset="0"/>
+                <a:cs typeface="Calibri" panose="020F0502020204030204" pitchFamily="34" charset="0"/>
+              </a:rPr>
+              <a:t>Foster scoring/compliance standardization across federal government</a:t>
+            </a:r>
+          </a:p>
+        </p:txBody>
+      </p:sp>
+    </p:spTree>
+    <p:extLst>
+      <p:ext uri="{BB962C8B-B14F-4D97-AF65-F5344CB8AC3E}">
+        <p14:creationId xmlns:p14="http://schemas.microsoft.com/office/powerpoint/2010/main" val="1015909237"/>
+      </p:ext>
+    </p:extLst>
+  </p:cSld>
+  <p:clrMapOvr>
+    <a:masterClrMapping/>
+  </p:clrMapOvr>
+</p:sld>
+</file>
+
+<file path=ppt/slides/slide4.xml><?xml version="1.0" encoding="utf-8"?>
+<p:sld xmlns:a="http://schemas.openxmlformats.org/drawingml/2006/main" xmlns:r="http://schemas.openxmlformats.org/officeDocument/2006/relationships" xmlns:p="http://schemas.openxmlformats.org/presentationml/2006/main">
+  <p:cSld>
+    <p:spTree>
+      <p:nvGrpSpPr>
+        <p:cNvPr id="1" name=""/>
+        <p:cNvGrpSpPr/>
+        <p:nvPr/>
+      </p:nvGrpSpPr>
+      <p:grpSpPr>
+        <a:xfrm>
+          <a:off x="0" y="0"/>
+          <a:ext cx="0" cy="0"/>
+          <a:chOff x="0" y="0"/>
+          <a:chExt cx="0" cy="0"/>
+        </a:xfrm>
+      </p:grpSpPr>
+      <p:sp>
+        <p:nvSpPr>
+          <p:cNvPr id="2" name="Slide Number Placeholder 1">
+            <a:extLst>
+              <a:ext uri="{FF2B5EF4-FFF2-40B4-BE49-F238E27FC236}">
+                <a16:creationId xmlns:a16="http://schemas.microsoft.com/office/drawing/2014/main" id="{C3876B54-91C7-4CA0-981B-0280BE7EB7E4}"/>
+              </a:ext>
+            </a:extLst>
+          </p:cNvPr>
+          <p:cNvSpPr>
+            <a:spLocks noGrp="1"/>
+          </p:cNvSpPr>
+          <p:nvPr>
+            <p:ph type="sldNum" sz="quarter" idx="4"/>
+          </p:nvPr>
+        </p:nvSpPr>
+        <p:spPr/>
+        <p:txBody>
+          <a:bodyPr/>
+          <a:lstStyle/>
+          <a:p>
+            <a:r>
+              <a:rPr lang="en-US"/>
+              <a:t>Presented by DHS | </a:t>
+            </a:r>
+            <a:fld id="{8997B844-ACA2-A34A-B180-F01E98B0D70C}" type="slidenum">
+              <a:rPr lang="en-US" smtClean="0"/>
+              <a:pPr/>
+              <a:t>4</a:t>
             </a:fld>
             <a:endParaRPr lang="en-US" dirty="0"/>
           </a:p>
@@ -5897,8 +6693,8 @@
                 <a:solidFill>
                   <a:srgbClr val="0070C0"/>
                 </a:solidFill>
-                <a:latin typeface="Arial" panose="020B0604020202020204" pitchFamily="34" charset="0"/>
-                <a:cs typeface="Arial" panose="020B0604020202020204" pitchFamily="34" charset="0"/>
+                <a:latin typeface="Calibri" panose="020F0502020204030204" pitchFamily="34" charset="0"/>
+                <a:cs typeface="Calibri" panose="020F0502020204030204" pitchFamily="34" charset="0"/>
               </a:rPr>
               <a:t>Comprises Four </a:t>
             </a:r>
@@ -5907,8 +6703,8 @@
                 <a:solidFill>
                   <a:srgbClr val="0070C0"/>
                 </a:solidFill>
-                <a:latin typeface="Arial" panose="020B0604020202020204" pitchFamily="34" charset="0"/>
-                <a:cs typeface="Arial" panose="020B0604020202020204" pitchFamily="34" charset="0"/>
+                <a:latin typeface="Calibri" panose="020F0502020204030204" pitchFamily="34" charset="0"/>
+                <a:cs typeface="Calibri" panose="020F0502020204030204" pitchFamily="34" charset="0"/>
               </a:rPr>
               <a:t>Principles</a:t>
             </a:r>
@@ -5917,8 +6713,8 @@
                 <a:solidFill>
                   <a:srgbClr val="0070C0"/>
                 </a:solidFill>
-                <a:latin typeface="Arial" panose="020B0604020202020204" pitchFamily="34" charset="0"/>
-                <a:cs typeface="Arial" panose="020B0604020202020204" pitchFamily="34" charset="0"/>
+                <a:latin typeface="Calibri" panose="020F0502020204030204" pitchFamily="34" charset="0"/>
+                <a:cs typeface="Calibri" panose="020F0502020204030204" pitchFamily="34" charset="0"/>
               </a:rPr>
               <a:t> Frameworks</a:t>
             </a:r>
@@ -5938,7 +6734,7 @@
 </p:sld>
 </file>
 
-<file path=ppt/slides/slide4.xml><?xml version="1.0" encoding="utf-8"?>
+<file path=ppt/slides/slide5.xml><?xml version="1.0" encoding="utf-8"?>
 <p:sld xmlns:a="http://schemas.openxmlformats.org/drawingml/2006/main" xmlns:r="http://schemas.openxmlformats.org/officeDocument/2006/relationships" xmlns:p="http://schemas.openxmlformats.org/presentationml/2006/main">
   <p:cSld>
     <p:spTree>
@@ -5983,7 +6779,7 @@
             <a:fld id="{8997B844-ACA2-A34A-B180-F01E98B0D70C}" type="slidenum">
               <a:rPr lang="en-US" smtClean="0"/>
               <a:pPr/>
-              <a:t>4</a:t>
+              <a:t>5</a:t>
             </a:fld>
             <a:endParaRPr lang="en-US" dirty="0"/>
           </a:p>
@@ -6391,7 +7187,7 @@
         </p:nvCxnSpPr>
         <p:spPr>
           <a:xfrm flipH="1">
-            <a:off x="6914062" y="1505803"/>
+            <a:off x="7063052" y="1519171"/>
             <a:ext cx="555813" cy="409433"/>
           </a:xfrm>
           <a:prstGeom prst="straightConnector1">
@@ -6434,7 +7230,7 @@
         <p:spPr>
           <a:xfrm>
             <a:off x="7469875" y="1042118"/>
-            <a:ext cx="1477188" cy="1169551"/>
+            <a:ext cx="1477188" cy="954107"/>
           </a:xfrm>
           <a:prstGeom prst="rect">
             <a:avLst/>
@@ -6447,6 +7243,7 @@
           </a:bodyPr>
           <a:lstStyle/>
           <a:p>
+            <a:pPr algn="ctr"/>
             <a:r>
               <a:rPr lang="en-US" sz="1400" dirty="0">
                 <a:solidFill>
@@ -6455,10 +7252,11 @@
                 <a:latin typeface="Calibri" panose="020F0502020204030204" pitchFamily="34" charset="0"/>
                 <a:cs typeface="Calibri" panose="020F0502020204030204" pitchFamily="34" charset="0"/>
               </a:rPr>
-              <a:t>These will need to be further broken down </a:t>
-            </a:r>
-          </a:p>
-          <a:p>
+              <a:t>These need to be broken down </a:t>
+            </a:r>
+          </a:p>
+          <a:p>
+            <a:pPr algn="ctr"/>
             <a:r>
               <a:rPr lang="en-US" sz="1400" dirty="0">
                 <a:solidFill>
@@ -6467,7 +7265,7 @@
                 <a:latin typeface="Calibri" panose="020F0502020204030204" pitchFamily="34" charset="0"/>
                 <a:cs typeface="Calibri" panose="020F0502020204030204" pitchFamily="34" charset="0"/>
               </a:rPr>
-              <a:t>into deeper subsections</a:t>
+              <a:t>into deeper subsections!</a:t>
             </a:r>
           </a:p>
         </p:txBody>
@@ -6656,6 +7454,105 @@
           </a:p>
         </p:txBody>
       </p:sp>
+      <p:cxnSp>
+        <p:nvCxnSpPr>
+          <p:cNvPr id="6" name="Straight Arrow Connector 5">
+            <a:extLst>
+              <a:ext uri="{FF2B5EF4-FFF2-40B4-BE49-F238E27FC236}">
+                <a16:creationId xmlns:a16="http://schemas.microsoft.com/office/drawing/2014/main" id="{5D39965E-09D8-EDFA-8BA1-9346EFA15873}"/>
+              </a:ext>
+            </a:extLst>
+          </p:cNvPr>
+          <p:cNvCxnSpPr>
+            <a:cxnSpLocks/>
+          </p:cNvCxnSpPr>
+          <p:nvPr/>
+        </p:nvCxnSpPr>
+        <p:spPr>
+          <a:xfrm>
+            <a:off x="1059918" y="2977559"/>
+            <a:ext cx="602783" cy="287359"/>
+          </a:xfrm>
+          <a:prstGeom prst="straightConnector1">
+            <a:avLst/>
+          </a:prstGeom>
+          <a:ln>
+            <a:solidFill>
+              <a:srgbClr val="0070C0"/>
+            </a:solidFill>
+            <a:tailEnd type="triangle"/>
+          </a:ln>
+        </p:spPr>
+        <p:style>
+          <a:lnRef idx="2">
+            <a:schemeClr val="accent1"/>
+          </a:lnRef>
+          <a:fillRef idx="0">
+            <a:schemeClr val="accent1"/>
+          </a:fillRef>
+          <a:effectRef idx="1">
+            <a:schemeClr val="accent1"/>
+          </a:effectRef>
+          <a:fontRef idx="minor">
+            <a:schemeClr val="tx1"/>
+          </a:fontRef>
+        </p:style>
+      </p:cxnSp>
+      <p:sp>
+        <p:nvSpPr>
+          <p:cNvPr id="17" name="TextBox 16">
+            <a:extLst>
+              <a:ext uri="{FF2B5EF4-FFF2-40B4-BE49-F238E27FC236}">
+                <a16:creationId xmlns:a16="http://schemas.microsoft.com/office/drawing/2014/main" id="{22B779BB-4E34-79E6-1668-8AEECD4806BB}"/>
+              </a:ext>
+            </a:extLst>
+          </p:cNvPr>
+          <p:cNvSpPr txBox="1"/>
+          <p:nvPr/>
+        </p:nvSpPr>
+        <p:spPr>
+          <a:xfrm>
+            <a:off x="196936" y="1418049"/>
+            <a:ext cx="1477188" cy="1600438"/>
+          </a:xfrm>
+          <a:prstGeom prst="rect">
+            <a:avLst/>
+          </a:prstGeom>
+          <a:noFill/>
+        </p:spPr>
+        <p:txBody>
+          <a:bodyPr wrap="square" rtlCol="0">
+            <a:spAutoFit/>
+          </a:bodyPr>
+          <a:lstStyle/>
+          <a:p>
+            <a:pPr algn="ctr"/>
+            <a:r>
+              <a:rPr lang="en-US" sz="1400" dirty="0">
+                <a:solidFill>
+                  <a:srgbClr val="0070C0"/>
+                </a:solidFill>
+                <a:latin typeface="Calibri" panose="020F0502020204030204" pitchFamily="34" charset="0"/>
+                <a:cs typeface="Calibri" panose="020F0502020204030204" pitchFamily="34" charset="0"/>
+              </a:rPr>
+              <a:t>Who is responsible for answering? </a:t>
+            </a:r>
+          </a:p>
+          <a:p>
+            <a:pPr algn="ctr"/>
+            <a:r>
+              <a:rPr lang="en-US" sz="1400" dirty="0">
+                <a:solidFill>
+                  <a:srgbClr val="0070C0"/>
+                </a:solidFill>
+                <a:latin typeface="Calibri" panose="020F0502020204030204" pitchFamily="34" charset="0"/>
+                <a:cs typeface="Calibri" panose="020F0502020204030204" pitchFamily="34" charset="0"/>
+              </a:rPr>
+              <a:t>How would the necessary perspectives be gathered?</a:t>
+            </a:r>
+          </a:p>
+        </p:txBody>
+      </p:sp>
     </p:spTree>
     <p:extLst>
       <p:ext uri="{BB962C8B-B14F-4D97-AF65-F5344CB8AC3E}">
@@ -6669,7 +7566,7 @@
 </p:sld>
 </file>
 
-<file path=ppt/slides/slide5.xml><?xml version="1.0" encoding="utf-8"?>
+<file path=ppt/slides/slide6.xml><?xml version="1.0" encoding="utf-8"?>
 <p:sld xmlns:a="http://schemas.openxmlformats.org/drawingml/2006/main" xmlns:r="http://schemas.openxmlformats.org/officeDocument/2006/relationships" xmlns:p="http://schemas.openxmlformats.org/presentationml/2006/main">
   <p:cSld>
     <p:spTree>
@@ -6714,7 +7611,7 @@
             <a:fld id="{8997B844-ACA2-A34A-B180-F01E98B0D70C}" type="slidenum">
               <a:rPr lang="en-US" smtClean="0"/>
               <a:pPr/>
-              <a:t>5</a:t>
+              <a:t>6</a:t>
             </a:fld>
             <a:endParaRPr lang="en-US" dirty="0"/>
           </a:p>
@@ -6864,7 +7761,7 @@
           <p:nvPr>
             <p:extLst>
               <p:ext uri="{D42A27DB-BD31-4B8C-83A1-F6EECF244321}">
-                <p14:modId xmlns:p14="http://schemas.microsoft.com/office/powerpoint/2010/main" val="825747237"/>
+                <p14:modId xmlns:p14="http://schemas.microsoft.com/office/powerpoint/2010/main" val="676178452"/>
               </p:ext>
             </p:extLst>
           </p:nvPr>
@@ -6877,12 +7774,12 @@
           <a:graphicData uri="http://schemas.openxmlformats.org/presentationml/2006/ole">
             <mc:AlternateContent xmlns:mc="http://schemas.openxmlformats.org/markup-compatibility/2006">
               <mc:Choice xmlns:v="urn:schemas-microsoft-com:vml" Requires="v">
-                <p:oleObj spid="_x0000_s2122" name="Bitmap Image" r:id="rId4" imgW="7728120" imgH="9226440" progId="Paint.Picture.1">
+                <p:oleObj name="Bitmap Image" r:id="rId3" imgW="7728120" imgH="9226440" progId="Paint.Picture.1">
                   <p:embed/>
                 </p:oleObj>
               </mc:Choice>
               <mc:Fallback>
-                <p:oleObj name="Bitmap Image" r:id="rId4" imgW="7728120" imgH="9226440" progId="Paint.Picture.1">
+                <p:oleObj name="Bitmap Image" r:id="rId3" imgW="7728120" imgH="9226440" progId="Paint.Picture.1">
                   <p:embed/>
                   <p:pic>
                     <p:nvPicPr>
@@ -6897,7 +7794,7 @@
                       <p:nvPr/>
                     </p:nvPicPr>
                     <p:blipFill>
-                      <a:blip r:embed="rId5">
+                      <a:blip r:embed="rId4">
                         <a:alphaModFix amt="50000"/>
                       </a:blip>
                       <a:stretch>
@@ -6932,7 +7829,13 @@
           <p:cNvGraphicFramePr>
             <a:graphicFrameLocks noChangeAspect="1"/>
           </p:cNvGraphicFramePr>
-          <p:nvPr/>
+          <p:nvPr>
+            <p:extLst>
+              <p:ext uri="{D42A27DB-BD31-4B8C-83A1-F6EECF244321}">
+                <p14:modId xmlns:p14="http://schemas.microsoft.com/office/powerpoint/2010/main" val="40870907"/>
+              </p:ext>
+            </p:extLst>
+          </p:nvPr>
         </p:nvGraphicFramePr>
         <p:xfrm>
           <a:off x="626193" y="3361295"/>
@@ -6942,12 +7845,12 @@
           <a:graphicData uri="http://schemas.openxmlformats.org/presentationml/2006/ole">
             <mc:AlternateContent xmlns:mc="http://schemas.openxmlformats.org/markup-compatibility/2006">
               <mc:Choice xmlns:v="urn:schemas-microsoft-com:vml" Requires="v">
-                <p:oleObj spid="_x0000_s2123" name="Bitmap Image" r:id="rId6" imgW="6921360" imgH="3054240" progId="Paint.Picture.1">
+                <p:oleObj name="Bitmap Image" r:id="rId5" imgW="6921360" imgH="3054240" progId="Paint.Picture.1">
                   <p:embed/>
                 </p:oleObj>
               </mc:Choice>
               <mc:Fallback>
-                <p:oleObj name="Bitmap Image" r:id="rId6" imgW="6921360" imgH="3054240" progId="Paint.Picture.1">
+                <p:oleObj name="Bitmap Image" r:id="rId5" imgW="6921360" imgH="3054240" progId="Paint.Picture.1">
                   <p:embed/>
                   <p:pic>
                     <p:nvPicPr>
@@ -6962,7 +7865,7 @@
                       <p:nvPr/>
                     </p:nvPicPr>
                     <p:blipFill>
-                      <a:blip r:embed="rId7"/>
+                      <a:blip r:embed="rId6"/>
                       <a:stretch>
                         <a:fillRect/>
                       </a:stretch>
@@ -7164,7 +8067,7 @@
 </p:sld>
 </file>
 
-<file path=ppt/slides/slide6.xml><?xml version="1.0" encoding="utf-8"?>
+<file path=ppt/slides/slide7.xml><?xml version="1.0" encoding="utf-8"?>
 <p:sld xmlns:a="http://schemas.openxmlformats.org/drawingml/2006/main" xmlns:r="http://schemas.openxmlformats.org/officeDocument/2006/relationships" xmlns:p="http://schemas.openxmlformats.org/presentationml/2006/main">
   <p:cSld>
     <p:spTree>
@@ -7181,72 +8084,6 @@
           <a:chExt cx="0" cy="0"/>
         </a:xfrm>
       </p:grpSpPr>
-      <p:sp>
-        <p:nvSpPr>
-          <p:cNvPr id="2" name="Slide Number Placeholder 1">
-            <a:extLst>
-              <a:ext uri="{FF2B5EF4-FFF2-40B4-BE49-F238E27FC236}">
-                <a16:creationId xmlns:a16="http://schemas.microsoft.com/office/drawing/2014/main" id="{C3876B54-91C7-4CA0-981B-0280BE7EB7E4}"/>
-              </a:ext>
-            </a:extLst>
-          </p:cNvPr>
-          <p:cNvSpPr>
-            <a:spLocks noGrp="1"/>
-          </p:cNvSpPr>
-          <p:nvPr>
-            <p:ph type="sldNum" sz="quarter" idx="4"/>
-          </p:nvPr>
-        </p:nvSpPr>
-        <p:spPr/>
-        <p:txBody>
-          <a:bodyPr/>
-          <a:lstStyle/>
-          <a:p>
-            <a:r>
-              <a:rPr lang="en-US"/>
-              <a:t>Presented by DHS | </a:t>
-            </a:r>
-            <a:fld id="{8997B844-ACA2-A34A-B180-F01E98B0D70C}" type="slidenum">
-              <a:rPr lang="en-US" smtClean="0"/>
-              <a:pPr/>
-              <a:t>6</a:t>
-            </a:fld>
-            <a:endParaRPr lang="en-US" dirty="0"/>
-          </a:p>
-        </p:txBody>
-      </p:sp>
-      <p:sp>
-        <p:nvSpPr>
-          <p:cNvPr id="3" name="Title 2">
-            <a:extLst>
-              <a:ext uri="{FF2B5EF4-FFF2-40B4-BE49-F238E27FC236}">
-                <a16:creationId xmlns:a16="http://schemas.microsoft.com/office/drawing/2014/main" id="{9D6973F2-923D-4F4F-8A40-6D33454876B0}"/>
-              </a:ext>
-            </a:extLst>
-          </p:cNvPr>
-          <p:cNvSpPr>
-            <a:spLocks noGrp="1"/>
-          </p:cNvSpPr>
-          <p:nvPr>
-            <p:ph type="title"/>
-          </p:nvPr>
-        </p:nvSpPr>
-        <p:spPr/>
-        <p:txBody>
-          <a:bodyPr/>
-          <a:lstStyle/>
-          <a:p>
-            <a:r>
-              <a:rPr lang="en-US" dirty="0">
-                <a:solidFill>
-                  <a:schemeClr val="bg1"/>
-                </a:solidFill>
-              </a:rPr>
-              <a:t>Concept of Operations (cont.)</a:t>
-            </a:r>
-          </a:p>
-        </p:txBody>
-      </p:sp>
       <p:graphicFrame>
         <p:nvGraphicFramePr>
           <p:cNvPr id="8" name="Object 7">
@@ -7262,7 +8099,7 @@
           <p:nvPr>
             <p:extLst>
               <p:ext uri="{D42A27DB-BD31-4B8C-83A1-F6EECF244321}">
-                <p14:modId xmlns:p14="http://schemas.microsoft.com/office/powerpoint/2010/main" val="3198971048"/>
+                <p14:modId xmlns:p14="http://schemas.microsoft.com/office/powerpoint/2010/main" val="2727817370"/>
               </p:ext>
             </p:extLst>
           </p:nvPr>
@@ -7275,12 +8112,12 @@
           <a:graphicData uri="http://schemas.openxmlformats.org/presentationml/2006/ole">
             <mc:AlternateContent xmlns:mc="http://schemas.openxmlformats.org/markup-compatibility/2006">
               <mc:Choice xmlns:v="urn:schemas-microsoft-com:vml" Requires="v">
-                <p:oleObj spid="_x0000_s5142" name="Bitmap Image" r:id="rId4" imgW="7162920" imgH="3187800" progId="Paint.Picture.1">
+                <p:oleObj name="Bitmap Image" r:id="rId3" imgW="7162920" imgH="3187800" progId="Paint.Picture.1">
                   <p:embed/>
                 </p:oleObj>
               </mc:Choice>
               <mc:Fallback>
-                <p:oleObj name="Bitmap Image" r:id="rId4" imgW="7162920" imgH="3187800" progId="Paint.Picture.1">
+                <p:oleObj name="Bitmap Image" r:id="rId3" imgW="7162920" imgH="3187800" progId="Paint.Picture.1">
                   <p:embed/>
                   <p:pic>
                     <p:nvPicPr>
@@ -7295,7 +8132,7 @@
                       <p:nvPr/>
                     </p:nvPicPr>
                     <p:blipFill>
-                      <a:blip r:embed="rId5"/>
+                      <a:blip r:embed="rId4"/>
                       <a:stretch>
                         <a:fillRect/>
                       </a:stretch>
@@ -7318,6 +8155,72 @@
       </p:graphicFrame>
       <p:sp>
         <p:nvSpPr>
+          <p:cNvPr id="2" name="Slide Number Placeholder 1">
+            <a:extLst>
+              <a:ext uri="{FF2B5EF4-FFF2-40B4-BE49-F238E27FC236}">
+                <a16:creationId xmlns:a16="http://schemas.microsoft.com/office/drawing/2014/main" id="{C3876B54-91C7-4CA0-981B-0280BE7EB7E4}"/>
+              </a:ext>
+            </a:extLst>
+          </p:cNvPr>
+          <p:cNvSpPr>
+            <a:spLocks noGrp="1"/>
+          </p:cNvSpPr>
+          <p:nvPr>
+            <p:ph type="sldNum" sz="quarter" idx="4"/>
+          </p:nvPr>
+        </p:nvSpPr>
+        <p:spPr/>
+        <p:txBody>
+          <a:bodyPr/>
+          <a:lstStyle/>
+          <a:p>
+            <a:r>
+              <a:rPr lang="en-US"/>
+              <a:t>Presented by DHS | </a:t>
+            </a:r>
+            <a:fld id="{8997B844-ACA2-A34A-B180-F01E98B0D70C}" type="slidenum">
+              <a:rPr lang="en-US" smtClean="0"/>
+              <a:pPr/>
+              <a:t>7</a:t>
+            </a:fld>
+            <a:endParaRPr lang="en-US" dirty="0"/>
+          </a:p>
+        </p:txBody>
+      </p:sp>
+      <p:sp>
+        <p:nvSpPr>
+          <p:cNvPr id="3" name="Title 2">
+            <a:extLst>
+              <a:ext uri="{FF2B5EF4-FFF2-40B4-BE49-F238E27FC236}">
+                <a16:creationId xmlns:a16="http://schemas.microsoft.com/office/drawing/2014/main" id="{9D6973F2-923D-4F4F-8A40-6D33454876B0}"/>
+              </a:ext>
+            </a:extLst>
+          </p:cNvPr>
+          <p:cNvSpPr>
+            <a:spLocks noGrp="1"/>
+          </p:cNvSpPr>
+          <p:nvPr>
+            <p:ph type="title"/>
+          </p:nvPr>
+        </p:nvSpPr>
+        <p:spPr/>
+        <p:txBody>
+          <a:bodyPr/>
+          <a:lstStyle/>
+          <a:p>
+            <a:r>
+              <a:rPr lang="en-US" dirty="0">
+                <a:solidFill>
+                  <a:schemeClr val="bg1"/>
+                </a:solidFill>
+              </a:rPr>
+              <a:t>Concept of Operations (cont.)</a:t>
+            </a:r>
+          </a:p>
+        </p:txBody>
+      </p:sp>
+      <p:sp>
+        <p:nvSpPr>
           <p:cNvPr id="13" name="TextBox 12">
             <a:extLst>
               <a:ext uri="{FF2B5EF4-FFF2-40B4-BE49-F238E27FC236}">
@@ -7350,8 +8253,8 @@
                 <a:solidFill>
                   <a:srgbClr val="0070C0"/>
                 </a:solidFill>
-                <a:latin typeface="Arial" panose="020B0604020202020204" pitchFamily="34" charset="0"/>
-                <a:cs typeface="Arial" panose="020B0604020202020204" pitchFamily="34" charset="0"/>
+                <a:latin typeface="Calibri" panose="020F0502020204030204" pitchFamily="34" charset="0"/>
+                <a:cs typeface="Calibri" panose="020F0502020204030204" pitchFamily="34" charset="0"/>
               </a:rPr>
               <a:t>Example Scores CSV Submission</a:t>
             </a:r>
@@ -7371,7 +8274,7 @@
 </p:sld>
 </file>
 
-<file path=ppt/slides/slide7.xml><?xml version="1.0" encoding="utf-8"?>
+<file path=ppt/slides/slide8.xml><?xml version="1.0" encoding="utf-8"?>
 <p:sld xmlns:a="http://schemas.openxmlformats.org/drawingml/2006/main" xmlns:r="http://schemas.openxmlformats.org/officeDocument/2006/relationships" xmlns:p="http://schemas.openxmlformats.org/presentationml/2006/main">
   <p:cSld>
     <p:spTree>
@@ -7416,7 +8319,7 @@
             <a:fld id="{8997B844-ACA2-A34A-B180-F01E98B0D70C}" type="slidenum">
               <a:rPr lang="en-US" smtClean="0"/>
               <a:pPr/>
-              <a:t>7</a:t>
+              <a:t>8</a:t>
             </a:fld>
             <a:endParaRPr lang="en-US" dirty="0"/>
           </a:p>
@@ -7599,12 +8502,12 @@
           <a:graphicData uri="http://schemas.openxmlformats.org/presentationml/2006/ole">
             <mc:AlternateContent xmlns:mc="http://schemas.openxmlformats.org/markup-compatibility/2006">
               <mc:Choice xmlns:v="urn:schemas-microsoft-com:vml" Requires="v">
-                <p:oleObj spid="_x0000_s3161" name="Bitmap Image" r:id="rId4" imgW="7728120" imgH="9226440" progId="Paint.Picture.1">
+                <p:oleObj name="Bitmap Image" r:id="rId3" imgW="7728120" imgH="9226440" progId="Paint.Picture.1">
                   <p:embed/>
                 </p:oleObj>
               </mc:Choice>
               <mc:Fallback>
-                <p:oleObj name="Bitmap Image" r:id="rId4" imgW="7728120" imgH="9226440" progId="Paint.Picture.1">
+                <p:oleObj name="Bitmap Image" r:id="rId3" imgW="7728120" imgH="9226440" progId="Paint.Picture.1">
                   <p:embed/>
                   <p:pic>
                     <p:nvPicPr>
@@ -7619,7 +8522,7 @@
                       <p:nvPr/>
                     </p:nvPicPr>
                     <p:blipFill>
-                      <a:blip r:embed="rId5">
+                      <a:blip r:embed="rId4">
                         <a:alphaModFix amt="10000"/>
                       </a:blip>
                       <a:stretch>
@@ -7670,12 +8573,12 @@
           <a:graphicData uri="http://schemas.openxmlformats.org/presentationml/2006/ole">
             <mc:AlternateContent xmlns:mc="http://schemas.openxmlformats.org/markup-compatibility/2006">
               <mc:Choice xmlns:v="urn:schemas-microsoft-com:vml" Requires="v">
-                <p:oleObj spid="_x0000_s3162" name="Bitmap Image" r:id="rId6" imgW="6921360" imgH="3054240" progId="Paint.Picture.1">
+                <p:oleObj name="Bitmap Image" r:id="rId5" imgW="6921360" imgH="3054240" progId="Paint.Picture.1">
                   <p:embed/>
                 </p:oleObj>
               </mc:Choice>
               <mc:Fallback>
-                <p:oleObj name="Bitmap Image" r:id="rId6" imgW="6921360" imgH="3054240" progId="Paint.Picture.1">
+                <p:oleObj name="Bitmap Image" r:id="rId5" imgW="6921360" imgH="3054240" progId="Paint.Picture.1">
                   <p:embed/>
                   <p:pic>
                     <p:nvPicPr>
@@ -7690,7 +8593,7 @@
                       <p:nvPr/>
                     </p:nvPicPr>
                     <p:blipFill>
-                      <a:blip r:embed="rId7">
+                      <a:blip r:embed="rId6">
                         <a:alphaModFix amt="20000"/>
                       </a:blip>
                       <a:stretch>
@@ -7891,12 +8794,12 @@
           <a:graphicData uri="http://schemas.openxmlformats.org/presentationml/2006/ole">
             <mc:AlternateContent xmlns:mc="http://schemas.openxmlformats.org/markup-compatibility/2006">
               <mc:Choice xmlns:v="urn:schemas-microsoft-com:vml" Requires="v">
-                <p:oleObj spid="_x0000_s3163" name="Bitmap Image" r:id="rId8" imgW="7677000" imgH="3397320" progId="Paint.Picture.1">
+                <p:oleObj name="Bitmap Image" r:id="rId7" imgW="7677000" imgH="3397320" progId="Paint.Picture.1">
                   <p:embed/>
                 </p:oleObj>
               </mc:Choice>
               <mc:Fallback>
-                <p:oleObj name="Bitmap Image" r:id="rId8" imgW="7677000" imgH="3397320" progId="Paint.Picture.1">
+                <p:oleObj name="Bitmap Image" r:id="rId7" imgW="7677000" imgH="3397320" progId="Paint.Picture.1">
                   <p:embed/>
                   <p:pic>
                     <p:nvPicPr>
@@ -7911,7 +8814,7 @@
                       <p:nvPr/>
                     </p:nvPicPr>
                     <p:blipFill>
-                      <a:blip r:embed="rId9"/>
+                      <a:blip r:embed="rId8"/>
                       <a:stretch>
                         <a:fillRect/>
                       </a:stretch>
@@ -8109,7 +9012,7 @@
 </p:sld>
 </file>
 
-<file path=ppt/slides/slide8.xml><?xml version="1.0" encoding="utf-8"?>
+<file path=ppt/slides/slide9.xml><?xml version="1.0" encoding="utf-8"?>
 <p:sld xmlns:a="http://schemas.openxmlformats.org/drawingml/2006/main" xmlns:r="http://schemas.openxmlformats.org/officeDocument/2006/relationships" xmlns:p="http://schemas.openxmlformats.org/presentationml/2006/main">
   <p:cSld>
     <p:spTree>
@@ -8154,7 +9057,7 @@
             <a:fld id="{8997B844-ACA2-A34A-B180-F01E98B0D70C}" type="slidenum">
               <a:rPr lang="en-US" smtClean="0"/>
               <a:pPr/>
-              <a:t>8</a:t>
+              <a:t>9</a:t>
             </a:fld>
             <a:endParaRPr lang="en-US" dirty="0"/>
           </a:p>
@@ -10269,8 +11172,8 @@
         </p:nvSpPr>
         <p:spPr>
           <a:xfrm>
-            <a:off x="58358" y="831607"/>
-            <a:ext cx="1898277" cy="2277547"/>
+            <a:off x="30216" y="834469"/>
+            <a:ext cx="1871025" cy="2192908"/>
           </a:xfrm>
           <a:prstGeom prst="rect">
             <a:avLst/>
@@ -10288,6 +11191,8 @@
                 <a:solidFill>
                   <a:schemeClr val="bg1"/>
                 </a:solidFill>
+                <a:latin typeface="Calibri" panose="020F0502020204030204" pitchFamily="34" charset="0"/>
+                <a:cs typeface="Calibri" panose="020F0502020204030204" pitchFamily="34" charset="0"/>
               </a:rPr>
               <a:t>Model Card</a:t>
             </a:r>
@@ -10297,24 +11202,40 @@
               <a:solidFill>
                 <a:schemeClr val="bg1"/>
               </a:solidFill>
+              <a:latin typeface="Calibri" panose="020F0502020204030204" pitchFamily="34" charset="0"/>
+              <a:cs typeface="Calibri" panose="020F0502020204030204" pitchFamily="34" charset="0"/>
             </a:endParaRPr>
           </a:p>
           <a:p>
+            <a:pPr>
+              <a:lnSpc>
+                <a:spcPct val="150000"/>
+              </a:lnSpc>
+            </a:pPr>
             <a:r>
               <a:rPr lang="en-US" sz="1100" b="1" dirty="0">
                 <a:solidFill>
                   <a:schemeClr val="bg1"/>
                 </a:solidFill>
+                <a:latin typeface="Calibri" panose="020F0502020204030204" pitchFamily="34" charset="0"/>
+                <a:cs typeface="Calibri" panose="020F0502020204030204" pitchFamily="34" charset="0"/>
               </a:rPr>
               <a:t>Arch: 3-layer, Sequential (FF)</a:t>
             </a:r>
           </a:p>
           <a:p>
+            <a:pPr>
+              <a:lnSpc>
+                <a:spcPct val="150000"/>
+              </a:lnSpc>
+            </a:pPr>
             <a:r>
               <a:rPr lang="en-US" sz="1100" b="1" dirty="0">
                 <a:solidFill>
                   <a:schemeClr val="bg1"/>
                 </a:solidFill>
+                <a:latin typeface="Calibri" panose="020F0502020204030204" pitchFamily="34" charset="0"/>
+                <a:cs typeface="Calibri" panose="020F0502020204030204" pitchFamily="34" charset="0"/>
               </a:rPr>
               <a:t>Package: </a:t>
             </a:r>
@@ -10323,6 +11244,8 @@
                 <a:solidFill>
                   <a:schemeClr val="bg1"/>
                 </a:solidFill>
+                <a:latin typeface="Calibri" panose="020F0502020204030204" pitchFamily="34" charset="0"/>
+                <a:cs typeface="Calibri" panose="020F0502020204030204" pitchFamily="34" charset="0"/>
               </a:rPr>
               <a:t>Keras</a:t>
             </a:r>
@@ -10331,66 +11254,68 @@
                 <a:solidFill>
                   <a:schemeClr val="bg1"/>
                 </a:solidFill>
+                <a:latin typeface="Calibri" panose="020F0502020204030204" pitchFamily="34" charset="0"/>
+                <a:cs typeface="Calibri" panose="020F0502020204030204" pitchFamily="34" charset="0"/>
               </a:rPr>
               <a:t>/TensorFlow</a:t>
             </a:r>
           </a:p>
           <a:p>
+            <a:pPr>
+              <a:lnSpc>
+                <a:spcPct val="150000"/>
+              </a:lnSpc>
+            </a:pPr>
             <a:r>
               <a:rPr lang="en-US" sz="1100" b="1" dirty="0">
                 <a:solidFill>
                   <a:schemeClr val="bg1"/>
                 </a:solidFill>
+                <a:latin typeface="Calibri" panose="020F0502020204030204" pitchFamily="34" charset="0"/>
+                <a:cs typeface="Calibri" panose="020F0502020204030204" pitchFamily="34" charset="0"/>
               </a:rPr>
               <a:t>Activation Function: Sigmoid</a:t>
             </a:r>
           </a:p>
           <a:p>
+            <a:pPr>
+              <a:lnSpc>
+                <a:spcPct val="150000"/>
+              </a:lnSpc>
+            </a:pPr>
             <a:r>
               <a:rPr lang="en-US" sz="1100" b="1" dirty="0">
                 <a:solidFill>
                   <a:schemeClr val="bg1"/>
                 </a:solidFill>
+                <a:latin typeface="Calibri" panose="020F0502020204030204" pitchFamily="34" charset="0"/>
+                <a:cs typeface="Calibri" panose="020F0502020204030204" pitchFamily="34" charset="0"/>
               </a:rPr>
               <a:t>Output: binary</a:t>
             </a:r>
           </a:p>
           <a:p>
-            <a:endParaRPr lang="en-US" sz="1100" b="1" dirty="0">
-              <a:solidFill>
-                <a:schemeClr val="bg1"/>
-              </a:solidFill>
-            </a:endParaRPr>
-          </a:p>
-          <a:p>
+            <a:pPr>
+              <a:lnSpc>
+                <a:spcPct val="150000"/>
+              </a:lnSpc>
+            </a:pPr>
             <a:r>
               <a:rPr lang="en-US" sz="1100" b="1" dirty="0">
                 <a:solidFill>
                   <a:schemeClr val="bg1"/>
                 </a:solidFill>
+                <a:latin typeface="Calibri" panose="020F0502020204030204" pitchFamily="34" charset="0"/>
+                <a:cs typeface="Calibri" panose="020F0502020204030204" pitchFamily="34" charset="0"/>
               </a:rPr>
               <a:t>Training: 100k synthetic</a:t>
             </a:r>
           </a:p>
           <a:p>
-            <a:r>
-              <a:rPr lang="en-US" sz="1100" b="1" dirty="0">
-                <a:solidFill>
-                  <a:schemeClr val="bg1"/>
-                </a:solidFill>
-              </a:rPr>
-              <a:t>Accuracy: TBD</a:t>
-            </a:r>
-          </a:p>
-          <a:p>
-            <a:endParaRPr lang="en-US" sz="1100" b="1" dirty="0">
-              <a:solidFill>
-                <a:schemeClr val="bg1"/>
-              </a:solidFill>
+            <a:endParaRPr lang="en-US" dirty="0">
+              <a:latin typeface="Calibri" panose="020F0502020204030204" pitchFamily="34" charset="0"/>
+              <a:cs typeface="Calibri" panose="020F0502020204030204" pitchFamily="34" charset="0"/>
             </a:endParaRPr>
-          </a:p>
-          <a:p>
-            <a:endParaRPr lang="en-US" dirty="0"/>
           </a:p>
         </p:txBody>
       </p:sp>
@@ -10398,222 +11323,6 @@
     <p:extLst>
       <p:ext uri="{BB962C8B-B14F-4D97-AF65-F5344CB8AC3E}">
         <p14:creationId xmlns:p14="http://schemas.microsoft.com/office/powerpoint/2010/main" val="4189912211"/>
-      </p:ext>
-    </p:extLst>
-  </p:cSld>
-  <p:clrMapOvr>
-    <a:masterClrMapping/>
-  </p:clrMapOvr>
-</p:sld>
-</file>
-
-<file path=ppt/slides/slide9.xml><?xml version="1.0" encoding="utf-8"?>
-<p:sld xmlns:a="http://schemas.openxmlformats.org/drawingml/2006/main" xmlns:r="http://schemas.openxmlformats.org/officeDocument/2006/relationships" xmlns:p="http://schemas.openxmlformats.org/presentationml/2006/main">
-  <p:cSld>
-    <p:spTree>
-      <p:nvGrpSpPr>
-        <p:cNvPr id="1" name=""/>
-        <p:cNvGrpSpPr/>
-        <p:nvPr/>
-      </p:nvGrpSpPr>
-      <p:grpSpPr>
-        <a:xfrm>
-          <a:off x="0" y="0"/>
-          <a:ext cx="0" cy="0"/>
-          <a:chOff x="0" y="0"/>
-          <a:chExt cx="0" cy="0"/>
-        </a:xfrm>
-      </p:grpSpPr>
-      <p:sp>
-        <p:nvSpPr>
-          <p:cNvPr id="2" name="Slide Number Placeholder 1">
-            <a:extLst>
-              <a:ext uri="{FF2B5EF4-FFF2-40B4-BE49-F238E27FC236}">
-                <a16:creationId xmlns:a16="http://schemas.microsoft.com/office/drawing/2014/main" id="{C3876B54-91C7-4CA0-981B-0280BE7EB7E4}"/>
-              </a:ext>
-            </a:extLst>
-          </p:cNvPr>
-          <p:cNvSpPr>
-            <a:spLocks noGrp="1"/>
-          </p:cNvSpPr>
-          <p:nvPr>
-            <p:ph type="sldNum" sz="quarter" idx="4"/>
-          </p:nvPr>
-        </p:nvSpPr>
-        <p:spPr/>
-        <p:txBody>
-          <a:bodyPr/>
-          <a:lstStyle/>
-          <a:p>
-            <a:r>
-              <a:rPr lang="en-US"/>
-              <a:t>Presented by DHS | </a:t>
-            </a:r>
-            <a:fld id="{8997B844-ACA2-A34A-B180-F01E98B0D70C}" type="slidenum">
-              <a:rPr lang="en-US" smtClean="0"/>
-              <a:pPr/>
-              <a:t>9</a:t>
-            </a:fld>
-            <a:endParaRPr lang="en-US" dirty="0"/>
-          </a:p>
-        </p:txBody>
-      </p:sp>
-      <p:sp>
-        <p:nvSpPr>
-          <p:cNvPr id="3" name="Title 2">
-            <a:extLst>
-              <a:ext uri="{FF2B5EF4-FFF2-40B4-BE49-F238E27FC236}">
-                <a16:creationId xmlns:a16="http://schemas.microsoft.com/office/drawing/2014/main" id="{9D6973F2-923D-4F4F-8A40-6D33454876B0}"/>
-              </a:ext>
-            </a:extLst>
-          </p:cNvPr>
-          <p:cNvSpPr>
-            <a:spLocks noGrp="1"/>
-          </p:cNvSpPr>
-          <p:nvPr>
-            <p:ph type="title"/>
-          </p:nvPr>
-        </p:nvSpPr>
-        <p:spPr/>
-        <p:txBody>
-          <a:bodyPr/>
-          <a:lstStyle/>
-          <a:p>
-            <a:r>
-              <a:rPr lang="en-US" dirty="0">
-                <a:solidFill>
-                  <a:schemeClr val="bg1"/>
-                </a:solidFill>
-              </a:rPr>
-              <a:t>Model Performance (Accuracy)</a:t>
-            </a:r>
-          </a:p>
-        </p:txBody>
-      </p:sp>
-      <p:pic>
-        <p:nvPicPr>
-          <p:cNvPr id="6" name="Picture 5" descr="A graph with blue and orange lines&#10;&#10;Description automatically generated">
-            <a:extLst>
-              <a:ext uri="{FF2B5EF4-FFF2-40B4-BE49-F238E27FC236}">
-                <a16:creationId xmlns:a16="http://schemas.microsoft.com/office/drawing/2014/main" id="{62DEF4AD-AFF4-81C1-6629-2A64A04B8B4C}"/>
-              </a:ext>
-            </a:extLst>
-          </p:cNvPr>
-          <p:cNvPicPr>
-            <a:picLocks noChangeAspect="1"/>
-          </p:cNvPicPr>
-          <p:nvPr/>
-        </p:nvPicPr>
-        <p:blipFill>
-          <a:blip r:embed="rId3"/>
-          <a:stretch>
-            <a:fillRect/>
-          </a:stretch>
-        </p:blipFill>
-        <p:spPr>
-          <a:xfrm>
-            <a:off x="590468" y="2857382"/>
-            <a:ext cx="2994901" cy="1821073"/>
-          </a:xfrm>
-          <a:prstGeom prst="rect">
-            <a:avLst/>
-          </a:prstGeom>
-        </p:spPr>
-      </p:pic>
-      <p:pic>
-        <p:nvPicPr>
-          <p:cNvPr id="11" name="Picture 10" descr="A graph with blue lines and orange lines&#10;&#10;Description automatically generated">
-            <a:extLst>
-              <a:ext uri="{FF2B5EF4-FFF2-40B4-BE49-F238E27FC236}">
-                <a16:creationId xmlns:a16="http://schemas.microsoft.com/office/drawing/2014/main" id="{65F67A0E-C35E-3AF9-EFC5-387A3F9F907E}"/>
-              </a:ext>
-            </a:extLst>
-          </p:cNvPr>
-          <p:cNvPicPr>
-            <a:picLocks noChangeAspect="1"/>
-          </p:cNvPicPr>
-          <p:nvPr/>
-        </p:nvPicPr>
-        <p:blipFill>
-          <a:blip r:embed="rId4"/>
-          <a:stretch>
-            <a:fillRect/>
-          </a:stretch>
-        </p:blipFill>
-        <p:spPr>
-          <a:xfrm>
-            <a:off x="5347521" y="2934617"/>
-            <a:ext cx="2557948" cy="1743839"/>
-          </a:xfrm>
-          <a:prstGeom prst="rect">
-            <a:avLst/>
-          </a:prstGeom>
-        </p:spPr>
-      </p:pic>
-      <p:pic>
-        <p:nvPicPr>
-          <p:cNvPr id="13" name="Picture 12" descr="A graph with blue and orange lines&#10;&#10;Description automatically generated">
-            <a:extLst>
-              <a:ext uri="{FF2B5EF4-FFF2-40B4-BE49-F238E27FC236}">
-                <a16:creationId xmlns:a16="http://schemas.microsoft.com/office/drawing/2014/main" id="{8AB8B9A6-B0A1-3353-FC85-01398E93AA83}"/>
-              </a:ext>
-            </a:extLst>
-          </p:cNvPr>
-          <p:cNvPicPr>
-            <a:picLocks noChangeAspect="1"/>
-          </p:cNvPicPr>
-          <p:nvPr/>
-        </p:nvPicPr>
-        <p:blipFill>
-          <a:blip r:embed="rId5"/>
-          <a:stretch>
-            <a:fillRect/>
-          </a:stretch>
-        </p:blipFill>
-        <p:spPr>
-          <a:xfrm>
-            <a:off x="590467" y="715057"/>
-            <a:ext cx="2994901" cy="2142326"/>
-          </a:xfrm>
-          <a:prstGeom prst="rect">
-            <a:avLst/>
-          </a:prstGeom>
-        </p:spPr>
-      </p:pic>
-      <p:pic>
-        <p:nvPicPr>
-          <p:cNvPr id="15" name="Picture 14" descr="A graph with blue and orange lines&#10;&#10;Description automatically generated">
-            <a:extLst>
-              <a:ext uri="{FF2B5EF4-FFF2-40B4-BE49-F238E27FC236}">
-                <a16:creationId xmlns:a16="http://schemas.microsoft.com/office/drawing/2014/main" id="{5BB9DD5D-A4F9-F662-FF40-A40C9457B778}"/>
-              </a:ext>
-            </a:extLst>
-          </p:cNvPr>
-          <p:cNvPicPr>
-            <a:picLocks noChangeAspect="1"/>
-          </p:cNvPicPr>
-          <p:nvPr/>
-        </p:nvPicPr>
-        <p:blipFill>
-          <a:blip r:embed="rId6"/>
-          <a:stretch>
-            <a:fillRect/>
-          </a:stretch>
-        </p:blipFill>
-        <p:spPr>
-          <a:xfrm>
-            <a:off x="5047871" y="715057"/>
-            <a:ext cx="2857598" cy="2219560"/>
-          </a:xfrm>
-          <a:prstGeom prst="rect">
-            <a:avLst/>
-          </a:prstGeom>
-        </p:spPr>
-      </p:pic>
-    </p:spTree>
-    <p:extLst>
-      <p:ext uri="{BB962C8B-B14F-4D97-AF65-F5344CB8AC3E}">
-        <p14:creationId xmlns:p14="http://schemas.microsoft.com/office/powerpoint/2010/main" val="2703077859"/>
       </p:ext>
     </p:extLst>
   </p:cSld>
@@ -11808,18 +12517,18 @@
 </file>
 
 <file path=customXml/item2.xml><?xml version="1.0" encoding="utf-8"?>
-<p:properties xmlns:p="http://schemas.microsoft.com/office/2006/metadata/properties" xmlns:xsi="http://www.w3.org/2001/XMLSchema-instance" xmlns:pc="http://schemas.microsoft.com/office/infopath/2007/PartnerControls">
-  <documentManagement/>
-</p:properties>
-</file>
-
-<file path=customXml/item3.xml><?xml version="1.0" encoding="utf-8"?>
 <?mso-contentType ?>
 <FormTemplates xmlns="http://schemas.microsoft.com/sharepoint/v3/contenttype/forms">
   <Display>DocumentLibraryForm</Display>
   <Edit>DocumentLibraryForm</Edit>
   <New>DocumentLibraryForm</New>
 </FormTemplates>
+</file>
+
+<file path=customXml/item3.xml><?xml version="1.0" encoding="utf-8"?>
+<p:properties xmlns:p="http://schemas.microsoft.com/office/2006/metadata/properties" xmlns:xsi="http://www.w3.org/2001/XMLSchema-instance" xmlns:pc="http://schemas.microsoft.com/office/infopath/2007/PartnerControls">
+  <documentManagement/>
+</p:properties>
 </file>
 
 <file path=customXml/itemProps1.xml><?xml version="1.0" encoding="utf-8"?>
@@ -11842,6 +12551,14 @@
 </file>
 
 <file path=customXml/itemProps2.xml><?xml version="1.0" encoding="utf-8"?>
+<ds:datastoreItem xmlns:ds="http://schemas.openxmlformats.org/officeDocument/2006/customXml" ds:itemID="{478A104F-5518-4387-A41C-C91F45F51F72}">
+  <ds:schemaRefs>
+    <ds:schemaRef ds:uri="http://schemas.microsoft.com/sharepoint/v3/contenttype/forms"/>
+  </ds:schemaRefs>
+</ds:datastoreItem>
+</file>
+
+<file path=customXml/itemProps3.xml><?xml version="1.0" encoding="utf-8"?>
 <ds:datastoreItem xmlns:ds="http://schemas.openxmlformats.org/officeDocument/2006/customXml" ds:itemID="{10D81E0D-2C63-4EA5-9F60-BC113953F389}">
   <ds:schemaRefs>
     <ds:schemaRef ds:uri="http://www.w3.org/XML/1998/namespace"/>
@@ -11856,12 +12573,4 @@
     <ds:schemaRef ds:uri="http://purl.org/dc/elements/1.1/"/>
   </ds:schemaRefs>
 </ds:datastoreItem>
-</file>
-
-<file path=customXml/itemProps3.xml><?xml version="1.0" encoding="utf-8"?>
-<ds:datastoreItem xmlns:ds="http://schemas.openxmlformats.org/officeDocument/2006/customXml" ds:itemID="{478A104F-5518-4387-A41C-C91F45F51F72}">
-  <ds:schemaRefs>
-    <ds:schemaRef ds:uri="http://schemas.microsoft.com/sharepoint/v3/contenttype/forms"/>
-  </ds:schemaRefs>
-</ds:datastoreItem>
 </file>
</xml_diff>